<commit_message>
Added full info in presentation about SwiftLint
</commit_message>
<xml_diff>
--- a/Presentation/SwiftLint-30.09.2022/SwiftLint-Abrosov.pptx
+++ b/Presentation/SwiftLint-30.09.2022/SwiftLint-Abrosov.pptx
@@ -16,11 +16,12 @@
     <p:sldId id="267" r:id="rId10"/>
     <p:sldId id="268" r:id="rId11"/>
     <p:sldId id="270" r:id="rId12"/>
-    <p:sldId id="271" r:id="rId13"/>
-    <p:sldId id="269" r:id="rId14"/>
-    <p:sldId id="265" r:id="rId15"/>
-    <p:sldId id="260" r:id="rId16"/>
-    <p:sldId id="258" r:id="rId17"/>
+    <p:sldId id="272" r:id="rId13"/>
+    <p:sldId id="271" r:id="rId14"/>
+    <p:sldId id="269" r:id="rId15"/>
+    <p:sldId id="265" r:id="rId16"/>
+    <p:sldId id="260" r:id="rId17"/>
+    <p:sldId id="258" r:id="rId18"/>
   </p:sldIdLst>
   <p:sldSz cx="12192000" cy="6858000"/>
   <p:notesSz cx="6858000" cy="9144000"/>
@@ -258,7 +259,7 @@
           <a:p>
             <a:fld id="{647CFE86-70FD-5945-A876-E5B01236E453}" type="datetimeFigureOut">
               <a:rPr lang="ru-RU" smtClean="0"/>
-              <a:t>16.09.2022</a:t>
+              <a:t>20.09.2022</a:t>
             </a:fld>
             <a:endParaRPr lang="ru-RU"/>
           </a:p>
@@ -428,7 +429,7 @@
           <a:p>
             <a:fld id="{647CFE86-70FD-5945-A876-E5B01236E453}" type="datetimeFigureOut">
               <a:rPr lang="ru-RU" smtClean="0"/>
-              <a:t>16.09.2022</a:t>
+              <a:t>20.09.2022</a:t>
             </a:fld>
             <a:endParaRPr lang="ru-RU"/>
           </a:p>
@@ -608,7 +609,7 @@
           <a:p>
             <a:fld id="{647CFE86-70FD-5945-A876-E5B01236E453}" type="datetimeFigureOut">
               <a:rPr lang="ru-RU" smtClean="0"/>
-              <a:t>16.09.2022</a:t>
+              <a:t>20.09.2022</a:t>
             </a:fld>
             <a:endParaRPr lang="ru-RU"/>
           </a:p>
@@ -778,7 +779,7 @@
           <a:p>
             <a:fld id="{647CFE86-70FD-5945-A876-E5B01236E453}" type="datetimeFigureOut">
               <a:rPr lang="ru-RU" smtClean="0"/>
-              <a:t>16.09.2022</a:t>
+              <a:t>20.09.2022</a:t>
             </a:fld>
             <a:endParaRPr lang="ru-RU"/>
           </a:p>
@@ -1024,7 +1025,7 @@
           <a:p>
             <a:fld id="{647CFE86-70FD-5945-A876-E5B01236E453}" type="datetimeFigureOut">
               <a:rPr lang="ru-RU" smtClean="0"/>
-              <a:t>16.09.2022</a:t>
+              <a:t>20.09.2022</a:t>
             </a:fld>
             <a:endParaRPr lang="ru-RU"/>
           </a:p>
@@ -1256,7 +1257,7 @@
           <a:p>
             <a:fld id="{647CFE86-70FD-5945-A876-E5B01236E453}" type="datetimeFigureOut">
               <a:rPr lang="ru-RU" smtClean="0"/>
-              <a:t>16.09.2022</a:t>
+              <a:t>20.09.2022</a:t>
             </a:fld>
             <a:endParaRPr lang="ru-RU"/>
           </a:p>
@@ -1623,7 +1624,7 @@
           <a:p>
             <a:fld id="{647CFE86-70FD-5945-A876-E5B01236E453}" type="datetimeFigureOut">
               <a:rPr lang="ru-RU" smtClean="0"/>
-              <a:t>16.09.2022</a:t>
+              <a:t>20.09.2022</a:t>
             </a:fld>
             <a:endParaRPr lang="ru-RU"/>
           </a:p>
@@ -1741,7 +1742,7 @@
           <a:p>
             <a:fld id="{647CFE86-70FD-5945-A876-E5B01236E453}" type="datetimeFigureOut">
               <a:rPr lang="ru-RU" smtClean="0"/>
-              <a:t>16.09.2022</a:t>
+              <a:t>20.09.2022</a:t>
             </a:fld>
             <a:endParaRPr lang="ru-RU"/>
           </a:p>
@@ -1836,7 +1837,7 @@
           <a:p>
             <a:fld id="{647CFE86-70FD-5945-A876-E5B01236E453}" type="datetimeFigureOut">
               <a:rPr lang="ru-RU" smtClean="0"/>
-              <a:t>16.09.2022</a:t>
+              <a:t>20.09.2022</a:t>
             </a:fld>
             <a:endParaRPr lang="ru-RU"/>
           </a:p>
@@ -2113,7 +2114,7 @@
           <a:p>
             <a:fld id="{647CFE86-70FD-5945-A876-E5B01236E453}" type="datetimeFigureOut">
               <a:rPr lang="ru-RU" smtClean="0"/>
-              <a:t>16.09.2022</a:t>
+              <a:t>20.09.2022</a:t>
             </a:fld>
             <a:endParaRPr lang="ru-RU"/>
           </a:p>
@@ -2370,7 +2371,7 @@
           <a:p>
             <a:fld id="{647CFE86-70FD-5945-A876-E5B01236E453}" type="datetimeFigureOut">
               <a:rPr lang="ru-RU" smtClean="0"/>
-              <a:t>16.09.2022</a:t>
+              <a:t>20.09.2022</a:t>
             </a:fld>
             <a:endParaRPr lang="ru-RU"/>
           </a:p>
@@ -2583,7 +2584,7 @@
           <a:p>
             <a:fld id="{647CFE86-70FD-5945-A876-E5B01236E453}" type="datetimeFigureOut">
               <a:rPr lang="ru-RU" smtClean="0"/>
-              <a:t>16.09.2022</a:t>
+              <a:t>20.09.2022</a:t>
             </a:fld>
             <a:endParaRPr lang="ru-RU"/>
           </a:p>
@@ -3503,7 +3504,7 @@
                 <a:effectLst/>
                 <a:latin typeface="-apple-system"/>
               </a:rPr>
-              <a:t>какие файлы необходимо проверять (необязательно</a:t>
+              <a:t>какие файлы необходимо проверять (необязательно)</a:t>
             </a:r>
           </a:p>
         </p:txBody>
@@ -3910,7 +3911,7 @@
           <p:cNvPr id="2" name="Заголовок 1">
             <a:extLst>
               <a:ext uri="{FF2B5EF4-FFF2-40B4-BE49-F238E27FC236}">
-                <a16:creationId xmlns:a16="http://schemas.microsoft.com/office/drawing/2014/main" id="{A2F145BF-871A-264B-A2B2-BE78C52B3DF0}"/>
+                <a16:creationId xmlns:a16="http://schemas.microsoft.com/office/drawing/2014/main" id="{BE3847D9-D5A5-A941-8A0E-032424C9C294}"/>
               </a:ext>
             </a:extLst>
           </p:cNvPr>
@@ -3932,442 +3933,47 @@
                   <a:srgbClr val="7030A0"/>
                 </a:solidFill>
               </a:rPr>
-              <a:t>Отключение правил в коде</a:t>
-            </a:r>
-          </a:p>
-        </p:txBody>
-      </p:sp>
-      <p:sp>
-        <p:nvSpPr>
-          <p:cNvPr id="3" name="Объект 2">
+              <a:t>Добавление своих правил</a:t>
+            </a:r>
+          </a:p>
+        </p:txBody>
+      </p:sp>
+      <p:pic>
+        <p:nvPicPr>
+          <p:cNvPr id="4" name="Объект 3">
             <a:extLst>
               <a:ext uri="{FF2B5EF4-FFF2-40B4-BE49-F238E27FC236}">
-                <a16:creationId xmlns:a16="http://schemas.microsoft.com/office/drawing/2014/main" id="{390FA913-8BF5-DD45-BCA5-FFA1C78F9A61}"/>
+                <a16:creationId xmlns:a16="http://schemas.microsoft.com/office/drawing/2014/main" id="{99D45BA7-90DE-1047-BB53-8479618A4D95}"/>
               </a:ext>
             </a:extLst>
           </p:cNvPr>
-          <p:cNvSpPr>
-            <a:spLocks noGrp="1"/>
-          </p:cNvSpPr>
+          <p:cNvPicPr>
+            <a:picLocks noGrp="1" noChangeAspect="1"/>
+          </p:cNvPicPr>
           <p:nvPr>
             <p:ph idx="1"/>
           </p:nvPr>
-        </p:nvSpPr>
-        <p:spPr/>
-        <p:txBody>
-          <a:bodyPr>
-            <a:normAutofit/>
-          </a:bodyPr>
-          <a:lstStyle/>
-          <a:p>
-            <a:r>
-              <a:rPr lang="ru-RU" b="0" i="0" u="none" strike="noStrike" dirty="0">
-                <a:effectLst/>
-                <a:latin typeface="-apple-system"/>
-              </a:rPr>
-              <a:t>Если хотите </a:t>
-            </a:r>
-            <a:r>
-              <a:rPr lang="ru-RU" b="0" i="0" u="none" strike="noStrike" dirty="0">
-                <a:solidFill>
-                  <a:srgbClr val="FFFF00"/>
-                </a:solidFill>
-                <a:effectLst/>
-                <a:latin typeface="-apple-system"/>
-              </a:rPr>
-              <a:t>отключить проверку в части кода</a:t>
-            </a:r>
-            <a:r>
-              <a:rPr lang="ru-RU" b="0" i="0" u="none" strike="noStrike" dirty="0">
-                <a:effectLst/>
-                <a:latin typeface="-apple-system"/>
-              </a:rPr>
-              <a:t>, используйте следующую конструкцию:</a:t>
-            </a:r>
-            <a:br>
-              <a:rPr lang="ru-RU" dirty="0"/>
-            </a:br>
-            <a:r>
-              <a:rPr lang="ru-RU" dirty="0"/>
-              <a:t>	</a:t>
-            </a:r>
-            <a:r>
-              <a:rPr lang="en" sz="2000" dirty="0">
-                <a:solidFill>
-                  <a:srgbClr val="00B0F0"/>
-                </a:solidFill>
-              </a:rPr>
-              <a:t>// </a:t>
-            </a:r>
-            <a:r>
-              <a:rPr lang="en" sz="2000" dirty="0" err="1">
-                <a:solidFill>
-                  <a:srgbClr val="00B0F0"/>
-                </a:solidFill>
-              </a:rPr>
-              <a:t>swiftlint:disable</a:t>
-            </a:r>
-            <a:r>
-              <a:rPr lang="en" sz="2000" dirty="0">
-                <a:solidFill>
-                  <a:srgbClr val="00B0F0"/>
-                </a:solidFill>
-              </a:rPr>
-              <a:t> &lt;rule1&gt; [&lt;rule2&gt; &lt;rule3&gt;...] </a:t>
-            </a:r>
-            <a:endParaRPr lang="ru-RU" sz="2000" dirty="0">
-              <a:solidFill>
-                <a:srgbClr val="00B0F0"/>
-              </a:solidFill>
-            </a:endParaRPr>
-          </a:p>
-          <a:p>
-            <a:pPr marL="457200" lvl="1" indent="0">
-              <a:buNone/>
-            </a:pPr>
-            <a:r>
-              <a:rPr lang="ru-RU" sz="2000" dirty="0">
-                <a:solidFill>
-                  <a:srgbClr val="00B0F0"/>
-                </a:solidFill>
-              </a:rPr>
-              <a:t>	</a:t>
-            </a:r>
-            <a:r>
-              <a:rPr lang="en" sz="2000" dirty="0">
-                <a:solidFill>
-                  <a:srgbClr val="00B0F0"/>
-                </a:solidFill>
-              </a:rPr>
-              <a:t>......... </a:t>
-            </a:r>
-            <a:endParaRPr lang="ru-RU" sz="2000" dirty="0">
-              <a:solidFill>
-                <a:srgbClr val="00B0F0"/>
-              </a:solidFill>
-            </a:endParaRPr>
-          </a:p>
-          <a:p>
-            <a:pPr marL="457200" lvl="1" indent="0">
-              <a:buNone/>
-            </a:pPr>
-            <a:r>
-              <a:rPr lang="ru-RU" sz="2000" dirty="0">
-                <a:solidFill>
-                  <a:srgbClr val="00B0F0"/>
-                </a:solidFill>
-              </a:rPr>
-              <a:t>	</a:t>
-            </a:r>
-            <a:r>
-              <a:rPr lang="en" sz="2000" dirty="0">
-                <a:solidFill>
-                  <a:srgbClr val="00B0F0"/>
-                </a:solidFill>
-              </a:rPr>
-              <a:t>// </a:t>
-            </a:r>
-            <a:r>
-              <a:rPr lang="en" sz="2000" dirty="0" err="1">
-                <a:solidFill>
-                  <a:srgbClr val="00B0F0"/>
-                </a:solidFill>
-              </a:rPr>
-              <a:t>swiftlint:enable</a:t>
-            </a:r>
-            <a:r>
-              <a:rPr lang="en" sz="2000" dirty="0">
-                <a:solidFill>
-                  <a:srgbClr val="00B0F0"/>
-                </a:solidFill>
-              </a:rPr>
-              <a:t> &lt;rule1&gt; [&lt;rule2&gt; &lt;rule3&gt;...] </a:t>
-            </a:r>
-            <a:endParaRPr lang="ru-RU" sz="2000" dirty="0">
-              <a:solidFill>
-                <a:srgbClr val="00B0F0"/>
-              </a:solidFill>
-            </a:endParaRPr>
-          </a:p>
-          <a:p>
-            <a:pPr marL="457200" lvl="1" indent="0">
-              <a:buNone/>
-            </a:pPr>
-            <a:r>
-              <a:rPr lang="ru-RU" sz="2000" dirty="0">
-                <a:solidFill>
-                  <a:srgbClr val="00B0F0"/>
-                </a:solidFill>
-              </a:rPr>
-              <a:t>	</a:t>
-            </a:r>
-          </a:p>
-          <a:p>
-            <a:pPr marL="457200" lvl="1" indent="0">
-              <a:buNone/>
-            </a:pPr>
-            <a:r>
-              <a:rPr lang="ru-RU" sz="2000" dirty="0">
-                <a:solidFill>
-                  <a:srgbClr val="00B0F0"/>
-                </a:solidFill>
-              </a:rPr>
-              <a:t>	</a:t>
-            </a:r>
-            <a:r>
-              <a:rPr lang="en" sz="2000" dirty="0" err="1">
-                <a:solidFill>
-                  <a:srgbClr val="00B0F0"/>
-                </a:solidFill>
-              </a:rPr>
-              <a:t>func</a:t>
-            </a:r>
-            <a:r>
-              <a:rPr lang="en" sz="2000" dirty="0">
-                <a:solidFill>
-                  <a:srgbClr val="00B0F0"/>
-                </a:solidFill>
-              </a:rPr>
-              <a:t> </a:t>
-            </a:r>
-            <a:r>
-              <a:rPr lang="en" sz="2000" dirty="0" err="1">
-                <a:solidFill>
-                  <a:srgbClr val="00B0F0"/>
-                </a:solidFill>
-              </a:rPr>
-              <a:t>printName</a:t>
-            </a:r>
-            <a:r>
-              <a:rPr lang="en" sz="2000" dirty="0">
-                <a:solidFill>
-                  <a:srgbClr val="00B0F0"/>
-                </a:solidFill>
-              </a:rPr>
-              <a:t>() { </a:t>
-            </a:r>
-            <a:endParaRPr lang="ru-RU" sz="2000" dirty="0">
-              <a:solidFill>
-                <a:srgbClr val="00B0F0"/>
-              </a:solidFill>
-            </a:endParaRPr>
-          </a:p>
-          <a:p>
-            <a:pPr marL="457200" lvl="1" indent="0">
-              <a:buNone/>
-            </a:pPr>
-            <a:r>
-              <a:rPr lang="ru-RU" sz="2000" dirty="0">
-                <a:solidFill>
-                  <a:srgbClr val="00B0F0"/>
-                </a:solidFill>
-              </a:rPr>
-              <a:t>		</a:t>
-            </a:r>
-            <a:r>
-              <a:rPr lang="en" sz="2000" dirty="0">
-                <a:solidFill>
-                  <a:srgbClr val="00B0F0"/>
-                </a:solidFill>
-              </a:rPr>
-              <a:t>// </a:t>
-            </a:r>
-            <a:r>
-              <a:rPr lang="en" sz="2000" dirty="0" err="1">
-                <a:solidFill>
-                  <a:srgbClr val="00B0F0"/>
-                </a:solidFill>
-              </a:rPr>
-              <a:t>swiftlint:disable</a:t>
-            </a:r>
-            <a:r>
-              <a:rPr lang="en" sz="2000" dirty="0">
-                <a:solidFill>
-                  <a:srgbClr val="00B0F0"/>
-                </a:solidFill>
-              </a:rPr>
-              <a:t> </a:t>
-            </a:r>
-            <a:r>
-              <a:rPr lang="en" sz="2000" dirty="0" err="1">
-                <a:solidFill>
-                  <a:srgbClr val="00B0F0"/>
-                </a:solidFill>
-              </a:rPr>
-              <a:t>force_cast</a:t>
-            </a:r>
-            <a:r>
-              <a:rPr lang="en" sz="2000" dirty="0">
-                <a:solidFill>
-                  <a:srgbClr val="00B0F0"/>
-                </a:solidFill>
-              </a:rPr>
-              <a:t> </a:t>
-            </a:r>
-            <a:endParaRPr lang="ru-RU" sz="2000" dirty="0">
-              <a:solidFill>
-                <a:srgbClr val="00B0F0"/>
-              </a:solidFill>
-            </a:endParaRPr>
-          </a:p>
-          <a:p>
-            <a:pPr marL="457200" lvl="1" indent="0">
-              <a:buNone/>
-            </a:pPr>
-            <a:r>
-              <a:rPr lang="ru-RU" sz="2000" dirty="0">
-                <a:solidFill>
-                  <a:srgbClr val="00B0F0"/>
-                </a:solidFill>
-              </a:rPr>
-              <a:t>		</a:t>
-            </a:r>
-            <a:r>
-              <a:rPr lang="en" sz="2000" dirty="0">
-                <a:solidFill>
-                  <a:srgbClr val="00B0F0"/>
-                </a:solidFill>
-              </a:rPr>
-              <a:t>let name = </a:t>
-            </a:r>
-            <a:r>
-              <a:rPr lang="en" sz="2000" dirty="0" err="1">
-                <a:solidFill>
-                  <a:srgbClr val="00B0F0"/>
-                </a:solidFill>
-              </a:rPr>
-              <a:t>loadName</a:t>
-            </a:r>
-            <a:r>
-              <a:rPr lang="en" sz="2000" dirty="0">
-                <a:solidFill>
-                  <a:srgbClr val="00B0F0"/>
-                </a:solidFill>
-              </a:rPr>
-              <a:t>() as! String </a:t>
-            </a:r>
-            <a:endParaRPr lang="ru-RU" sz="2000" dirty="0">
-              <a:solidFill>
-                <a:srgbClr val="00B0F0"/>
-              </a:solidFill>
-            </a:endParaRPr>
-          </a:p>
-          <a:p>
-            <a:pPr marL="457200" lvl="1" indent="0">
-              <a:buNone/>
-            </a:pPr>
-            <a:r>
-              <a:rPr lang="ru-RU" sz="2000" dirty="0">
-                <a:solidFill>
-                  <a:srgbClr val="00B0F0"/>
-                </a:solidFill>
-              </a:rPr>
-              <a:t>		</a:t>
-            </a:r>
-            <a:r>
-              <a:rPr lang="en" sz="2000" dirty="0">
-                <a:solidFill>
-                  <a:srgbClr val="00B0F0"/>
-                </a:solidFill>
-              </a:rPr>
-              <a:t>// </a:t>
-            </a:r>
-            <a:r>
-              <a:rPr lang="en" sz="2000" dirty="0" err="1">
-                <a:solidFill>
-                  <a:srgbClr val="00B0F0"/>
-                </a:solidFill>
-              </a:rPr>
-              <a:t>swiftlint:enable</a:t>
-            </a:r>
-            <a:r>
-              <a:rPr lang="en" sz="2000" dirty="0">
-                <a:solidFill>
-                  <a:srgbClr val="00B0F0"/>
-                </a:solidFill>
-              </a:rPr>
-              <a:t> </a:t>
-            </a:r>
-            <a:r>
-              <a:rPr lang="en" sz="2000" dirty="0" err="1">
-                <a:solidFill>
-                  <a:srgbClr val="00B0F0"/>
-                </a:solidFill>
-              </a:rPr>
-              <a:t>force_cast</a:t>
-            </a:r>
-            <a:r>
-              <a:rPr lang="en" sz="2000" dirty="0">
-                <a:solidFill>
-                  <a:srgbClr val="00B0F0"/>
-                </a:solidFill>
-              </a:rPr>
-              <a:t> </a:t>
-            </a:r>
-            <a:endParaRPr lang="ru-RU" sz="2000" dirty="0">
-              <a:solidFill>
-                <a:srgbClr val="00B0F0"/>
-              </a:solidFill>
-            </a:endParaRPr>
-          </a:p>
-          <a:p>
-            <a:pPr marL="457200" lvl="1" indent="0">
-              <a:buNone/>
-            </a:pPr>
-            <a:r>
-              <a:rPr lang="ru-RU" sz="2000" dirty="0">
-                <a:solidFill>
-                  <a:srgbClr val="00B0F0"/>
-                </a:solidFill>
-              </a:rPr>
-              <a:t>		</a:t>
-            </a:r>
-            <a:r>
-              <a:rPr lang="en" sz="2000" dirty="0">
-                <a:solidFill>
-                  <a:srgbClr val="00B0F0"/>
-                </a:solidFill>
-              </a:rPr>
-              <a:t>print(name) </a:t>
-            </a:r>
-            <a:endParaRPr lang="ru-RU" sz="2000" dirty="0">
-              <a:solidFill>
-                <a:srgbClr val="00B0F0"/>
-              </a:solidFill>
-            </a:endParaRPr>
-          </a:p>
-          <a:p>
-            <a:pPr marL="457200" lvl="1" indent="0">
-              <a:buNone/>
-            </a:pPr>
-            <a:r>
-              <a:rPr lang="ru-RU" sz="2000" dirty="0">
-                <a:solidFill>
-                  <a:srgbClr val="00B0F0"/>
-                </a:solidFill>
-              </a:rPr>
-              <a:t>	</a:t>
-            </a:r>
-            <a:r>
-              <a:rPr lang="en" sz="2000" dirty="0">
-                <a:solidFill>
-                  <a:srgbClr val="00B0F0"/>
-                </a:solidFill>
-              </a:rPr>
-              <a:t>}</a:t>
-            </a:r>
-            <a:endParaRPr lang="ru-RU" sz="2000" dirty="0">
-              <a:solidFill>
-                <a:srgbClr val="00B0F0"/>
-              </a:solidFill>
-            </a:endParaRPr>
-          </a:p>
-        </p:txBody>
-      </p:sp>
+        </p:nvPicPr>
+        <p:blipFill>
+          <a:blip r:embed="rId2"/>
+          <a:stretch>
+            <a:fillRect/>
+          </a:stretch>
+        </p:blipFill>
+        <p:spPr>
+          <a:xfrm>
+            <a:off x="1339850" y="3448844"/>
+            <a:ext cx="9512300" cy="1104900"/>
+          </a:xfrm>
+          <a:prstGeom prst="rect">
+            <a:avLst/>
+          </a:prstGeom>
+        </p:spPr>
+      </p:pic>
     </p:spTree>
     <p:extLst>
       <p:ext uri="{BB962C8B-B14F-4D97-AF65-F5344CB8AC3E}">
-        <p14:creationId xmlns:p14="http://schemas.microsoft.com/office/powerpoint/2010/main" val="3135939333"/>
+        <p14:creationId xmlns:p14="http://schemas.microsoft.com/office/powerpoint/2010/main" val="3768502497"/>
       </p:ext>
     </p:extLst>
   </p:cSld>
@@ -4399,7 +4005,7 @@
           <p:cNvPr id="2" name="Заголовок 1">
             <a:extLst>
               <a:ext uri="{FF2B5EF4-FFF2-40B4-BE49-F238E27FC236}">
-                <a16:creationId xmlns:a16="http://schemas.microsoft.com/office/drawing/2014/main" id="{DA04DAD3-50AA-BB44-B41F-1CAF57E5EFA3}"/>
+                <a16:creationId xmlns:a16="http://schemas.microsoft.com/office/drawing/2014/main" id="{A2F145BF-871A-264B-A2B2-BE78C52B3DF0}"/>
               </a:ext>
             </a:extLst>
           </p:cNvPr>
@@ -4416,19 +4022,13 @@
           <a:lstStyle/>
           <a:p>
             <a:r>
-              <a:rPr lang="ru-RU" b="1" i="0" u="none" strike="noStrike" dirty="0">
+              <a:rPr lang="ru-RU" dirty="0">
                 <a:solidFill>
                   <a:srgbClr val="7030A0"/>
                 </a:solidFill>
-                <a:effectLst/>
-              </a:rPr>
-              <a:t>Скорость сборки проекта</a:t>
-            </a:r>
-            <a:endParaRPr lang="ru-RU" dirty="0">
-              <a:solidFill>
-                <a:srgbClr val="7030A0"/>
-              </a:solidFill>
-            </a:endParaRPr>
+              </a:rPr>
+              <a:t>Отключение правил в коде</a:t>
+            </a:r>
           </a:p>
         </p:txBody>
       </p:sp>
@@ -4437,7 +4037,7 @@
           <p:cNvPr id="3" name="Объект 2">
             <a:extLst>
               <a:ext uri="{FF2B5EF4-FFF2-40B4-BE49-F238E27FC236}">
-                <a16:creationId xmlns:a16="http://schemas.microsoft.com/office/drawing/2014/main" id="{27B34F77-AF9C-A748-B7D5-7DCE6941CA4B}"/>
+                <a16:creationId xmlns:a16="http://schemas.microsoft.com/office/drawing/2014/main" id="{390FA913-8BF5-DD45-BCA5-FFA1C78F9A61}"/>
               </a:ext>
             </a:extLst>
           </p:cNvPr>
@@ -4448,44 +4048,19 @@
             <p:ph idx="1"/>
           </p:nvPr>
         </p:nvSpPr>
-        <p:spPr>
-          <a:xfrm>
-            <a:off x="838200" y="1825624"/>
-            <a:ext cx="10515600" cy="4782993"/>
-          </a:xfrm>
-        </p:spPr>
+        <p:spPr/>
         <p:txBody>
           <a:bodyPr>
-            <a:normAutofit lnSpcReduction="10000"/>
+            <a:normAutofit/>
           </a:bodyPr>
           <a:lstStyle/>
           <a:p>
             <a:r>
               <a:rPr lang="ru-RU" b="0" i="0" u="none" strike="noStrike" dirty="0">
-                <a:solidFill>
-                  <a:srgbClr val="FFFF00"/>
-                </a:solidFill>
-                <a:effectLst/>
-              </a:rPr>
-              <a:t>Очевидно, что использование </a:t>
-            </a:r>
-            <a:r>
-              <a:rPr lang="en" b="0" i="0" u="none" strike="noStrike" dirty="0" err="1">
-                <a:solidFill>
-                  <a:srgbClr val="FFFF00"/>
-                </a:solidFill>
-                <a:effectLst/>
-              </a:rPr>
-              <a:t>SwiftLint</a:t>
-            </a:r>
-            <a:r>
-              <a:rPr lang="en" b="0" i="0" u="none" strike="noStrike" dirty="0">
-                <a:solidFill>
-                  <a:srgbClr val="FFFF00"/>
-                </a:solidFill>
-                <a:effectLst/>
-              </a:rPr>
-              <a:t> </a:t>
+                <a:effectLst/>
+                <a:latin typeface="-apple-system"/>
+              </a:rPr>
+              <a:t>Если хотите </a:t>
             </a:r>
             <a:r>
               <a:rPr lang="ru-RU" b="0" i="0" u="none" strike="noStrike" dirty="0">
@@ -4493,614 +4068,401 @@
                   <a:srgbClr val="FFFF00"/>
                 </a:solidFill>
                 <a:effectLst/>
-              </a:rPr>
-              <a:t>требует дополнительного времени при сборке проекта. Если скорость сборки заметно проседает, стоит задуматься о проверке только измененных файлов. Для этого нужно заменить скрипт проверки в </a:t>
-            </a:r>
-            <a:r>
-              <a:rPr lang="en" b="0" i="0" u="none" strike="noStrike" dirty="0">
-                <a:solidFill>
-                  <a:srgbClr val="FFFF00"/>
-                </a:solidFill>
-                <a:effectLst/>
-              </a:rPr>
-              <a:t>Build Phases </a:t>
+                <a:latin typeface="-apple-system"/>
+              </a:rPr>
+              <a:t>отключить проверку в части кода</a:t>
             </a:r>
             <a:r>
               <a:rPr lang="ru-RU" b="0" i="0" u="none" strike="noStrike" dirty="0">
-                <a:solidFill>
-                  <a:srgbClr val="FFFF00"/>
-                </a:solidFill>
-                <a:effectLst/>
-              </a:rPr>
-              <a:t>на:</a:t>
-            </a:r>
-          </a:p>
-          <a:p>
-            <a:pPr marL="457200" lvl="1" indent="0">
-              <a:buNone/>
-            </a:pPr>
-            <a:r>
-              <a:rPr lang="ru-RU" sz="1700" b="0" i="0" u="none" strike="noStrike" dirty="0">
-                <a:solidFill>
-                  <a:srgbClr val="00B0F0"/>
-                </a:solidFill>
-                <a:effectLst/>
-                <a:latin typeface="Menlo" panose="020B0609030804020204" pitchFamily="49" charset="0"/>
-              </a:rPr>
+                <a:effectLst/>
+                <a:latin typeface="-apple-system"/>
+              </a:rPr>
+              <a:t>, используйте следующую конструкцию:</a:t>
+            </a:r>
+            <a:br>
+              <a:rPr lang="ru-RU" dirty="0"/>
+            </a:br>
+            <a:r>
+              <a:rPr lang="ru-RU" dirty="0"/>
               <a:t>	</a:t>
             </a:r>
             <a:r>
-              <a:rPr lang="en" sz="1400" b="0" i="0" u="none" strike="noStrike" dirty="0">
-                <a:solidFill>
-                  <a:srgbClr val="00B0F0"/>
-                </a:solidFill>
-                <a:effectLst/>
-                <a:latin typeface="Menlo" panose="020B0609030804020204" pitchFamily="49" charset="0"/>
-              </a:rPr>
-              <a:t>count=0 </a:t>
-            </a:r>
-            <a:endParaRPr lang="ru-RU" sz="1400" b="0" i="0" u="none" strike="noStrike" dirty="0">
-              <a:solidFill>
-                <a:srgbClr val="00B0F0"/>
-              </a:solidFill>
-              <a:effectLst/>
-              <a:latin typeface="Menlo" panose="020B0609030804020204" pitchFamily="49" charset="0"/>
-            </a:endParaRPr>
-          </a:p>
-          <a:p>
-            <a:pPr marL="914400" lvl="2" indent="0">
-              <a:buNone/>
-            </a:pPr>
-            <a:r>
-              <a:rPr lang="en" sz="1400" b="1" i="0" u="none" strike="noStrike" dirty="0">
-                <a:solidFill>
-                  <a:srgbClr val="00B0F0"/>
-                </a:solidFill>
-                <a:effectLst/>
-                <a:latin typeface="Menlo" panose="020B0609030804020204" pitchFamily="49" charset="0"/>
-              </a:rPr>
-              <a:t>for</a:t>
-            </a:r>
-            <a:r>
-              <a:rPr lang="en" sz="1400" b="0" i="0" u="none" strike="noStrike" dirty="0">
-                <a:solidFill>
-                  <a:srgbClr val="00B0F0"/>
-                </a:solidFill>
-                <a:effectLst/>
-                <a:latin typeface="Menlo" panose="020B0609030804020204" pitchFamily="49" charset="0"/>
-              </a:rPr>
-              <a:t> </a:t>
-            </a:r>
-            <a:r>
-              <a:rPr lang="en" sz="1400" b="0" i="0" u="none" strike="noStrike" dirty="0" err="1">
-                <a:solidFill>
-                  <a:srgbClr val="00B0F0"/>
-                </a:solidFill>
-                <a:effectLst/>
-                <a:latin typeface="Menlo" panose="020B0609030804020204" pitchFamily="49" charset="0"/>
-              </a:rPr>
-              <a:t>file_path</a:t>
-            </a:r>
-            <a:r>
-              <a:rPr lang="en" sz="1400" b="0" i="0" u="none" strike="noStrike" dirty="0">
-                <a:solidFill>
-                  <a:srgbClr val="00B0F0"/>
-                </a:solidFill>
-                <a:effectLst/>
-                <a:latin typeface="Menlo" panose="020B0609030804020204" pitchFamily="49" charset="0"/>
-              </a:rPr>
-              <a:t> </a:t>
-            </a:r>
-            <a:r>
-              <a:rPr lang="en" sz="1400" b="1" i="0" u="none" strike="noStrike" dirty="0">
-                <a:solidFill>
-                  <a:srgbClr val="00B0F0"/>
-                </a:solidFill>
-                <a:effectLst/>
-                <a:latin typeface="Menlo" panose="020B0609030804020204" pitchFamily="49" charset="0"/>
-              </a:rPr>
-              <a:t>in</a:t>
-            </a:r>
-            <a:r>
-              <a:rPr lang="en" sz="1400" b="0" i="0" u="none" strike="noStrike" dirty="0">
-                <a:solidFill>
-                  <a:srgbClr val="00B0F0"/>
-                </a:solidFill>
-                <a:effectLst/>
-                <a:latin typeface="Menlo" panose="020B0609030804020204" pitchFamily="49" charset="0"/>
-              </a:rPr>
-              <a:t> $(git ls-files -om --exclude-from=.</a:t>
-            </a:r>
-            <a:r>
-              <a:rPr lang="en" sz="1400" b="0" i="0" u="none" strike="noStrike" dirty="0" err="1">
-                <a:solidFill>
-                  <a:srgbClr val="00B0F0"/>
-                </a:solidFill>
-                <a:effectLst/>
-                <a:latin typeface="Menlo" panose="020B0609030804020204" pitchFamily="49" charset="0"/>
-              </a:rPr>
-              <a:t>gitignore</a:t>
-            </a:r>
-            <a:r>
-              <a:rPr lang="en" sz="1400" b="0" i="0" u="none" strike="noStrike" dirty="0">
-                <a:solidFill>
-                  <a:srgbClr val="00B0F0"/>
-                </a:solidFill>
-                <a:effectLst/>
-                <a:latin typeface="Menlo" panose="020B0609030804020204" pitchFamily="49" charset="0"/>
-              </a:rPr>
-              <a:t> | grep ".swift$"); </a:t>
-            </a:r>
-            <a:r>
-              <a:rPr lang="en" sz="1400" b="1" i="0" u="none" strike="noStrike" dirty="0">
-                <a:solidFill>
-                  <a:srgbClr val="00B0F0"/>
-                </a:solidFill>
-                <a:effectLst/>
-                <a:latin typeface="Menlo" panose="020B0609030804020204" pitchFamily="49" charset="0"/>
-              </a:rPr>
-              <a:t>do</a:t>
-            </a:r>
-            <a:r>
-              <a:rPr lang="en" sz="1400" b="0" i="0" u="none" strike="noStrike" dirty="0">
-                <a:solidFill>
-                  <a:srgbClr val="00B0F0"/>
-                </a:solidFill>
-                <a:effectLst/>
-                <a:latin typeface="Menlo" panose="020B0609030804020204" pitchFamily="49" charset="0"/>
-              </a:rPr>
-              <a:t> </a:t>
-            </a:r>
-            <a:endParaRPr lang="ru-RU" sz="1400" b="0" i="0" u="none" strike="noStrike" dirty="0">
-              <a:solidFill>
-                <a:srgbClr val="00B0F0"/>
-              </a:solidFill>
-              <a:effectLst/>
-              <a:latin typeface="Menlo" panose="020B0609030804020204" pitchFamily="49" charset="0"/>
-            </a:endParaRPr>
-          </a:p>
-          <a:p>
-            <a:pPr marL="914400" lvl="2" indent="0">
-              <a:buNone/>
-            </a:pPr>
-            <a:r>
-              <a:rPr lang="ru-RU" sz="1400" b="0" i="0" u="none" strike="noStrike" dirty="0">
-                <a:solidFill>
-                  <a:srgbClr val="00B0F0"/>
-                </a:solidFill>
-                <a:effectLst/>
-                <a:latin typeface="Menlo" panose="020B0609030804020204" pitchFamily="49" charset="0"/>
-              </a:rPr>
-              <a:t>	</a:t>
-            </a:r>
-            <a:r>
-              <a:rPr lang="en" sz="1400" b="0" i="0" u="none" strike="noStrike" dirty="0">
-                <a:solidFill>
-                  <a:srgbClr val="00B0F0"/>
-                </a:solidFill>
-                <a:effectLst/>
-                <a:latin typeface="Menlo" panose="020B0609030804020204" pitchFamily="49" charset="0"/>
-              </a:rPr>
-              <a:t>export </a:t>
-            </a:r>
-            <a:r>
-              <a:rPr lang="en" sz="1400" b="0" i="0" u="none" strike="noStrike" dirty="0" err="1">
-                <a:solidFill>
-                  <a:srgbClr val="00B0F0"/>
-                </a:solidFill>
-                <a:effectLst/>
-                <a:latin typeface="Menlo" panose="020B0609030804020204" pitchFamily="49" charset="0"/>
-              </a:rPr>
-              <a:t>SCRIPT_INPUT_FILE_$count</a:t>
-            </a:r>
-            <a:r>
-              <a:rPr lang="en" sz="1400" b="0" i="0" u="none" strike="noStrike" dirty="0">
-                <a:solidFill>
-                  <a:srgbClr val="00B0F0"/>
-                </a:solidFill>
-                <a:effectLst/>
-                <a:latin typeface="Menlo" panose="020B0609030804020204" pitchFamily="49" charset="0"/>
-              </a:rPr>
-              <a:t>=$</a:t>
-            </a:r>
-            <a:r>
-              <a:rPr lang="en" sz="1400" b="0" i="0" u="none" strike="noStrike" dirty="0" err="1">
-                <a:solidFill>
-                  <a:srgbClr val="00B0F0"/>
-                </a:solidFill>
-                <a:effectLst/>
-                <a:latin typeface="Menlo" panose="020B0609030804020204" pitchFamily="49" charset="0"/>
-              </a:rPr>
-              <a:t>file_path</a:t>
-            </a:r>
-            <a:r>
-              <a:rPr lang="en" sz="1400" b="0" i="0" u="none" strike="noStrike" dirty="0">
-                <a:solidFill>
-                  <a:srgbClr val="00B0F0"/>
-                </a:solidFill>
-                <a:effectLst/>
-                <a:latin typeface="Menlo" panose="020B0609030804020204" pitchFamily="49" charset="0"/>
-              </a:rPr>
-              <a:t> </a:t>
-            </a:r>
-            <a:endParaRPr lang="ru-RU" sz="1400" b="0" i="0" u="none" strike="noStrike" dirty="0">
-              <a:solidFill>
-                <a:srgbClr val="00B0F0"/>
-              </a:solidFill>
-              <a:effectLst/>
-              <a:latin typeface="Menlo" panose="020B0609030804020204" pitchFamily="49" charset="0"/>
-            </a:endParaRPr>
-          </a:p>
-          <a:p>
-            <a:pPr marL="914400" lvl="2" indent="0">
-              <a:buNone/>
-            </a:pPr>
-            <a:r>
-              <a:rPr lang="ru-RU" sz="1400" dirty="0">
-                <a:solidFill>
-                  <a:srgbClr val="00B0F0"/>
-                </a:solidFill>
-                <a:latin typeface="Menlo" panose="020B0609030804020204" pitchFamily="49" charset="0"/>
-              </a:rPr>
-              <a:t>	</a:t>
-            </a:r>
-            <a:r>
-              <a:rPr lang="en" sz="1400" b="0" i="0" u="none" strike="noStrike" dirty="0">
-                <a:solidFill>
-                  <a:srgbClr val="00B0F0"/>
-                </a:solidFill>
-                <a:effectLst/>
-                <a:latin typeface="Menlo" panose="020B0609030804020204" pitchFamily="49" charset="0"/>
-              </a:rPr>
-              <a:t>count=$((count + 1)) </a:t>
-            </a:r>
-            <a:endParaRPr lang="ru-RU" sz="1400" b="0" i="0" u="none" strike="noStrike" dirty="0">
-              <a:solidFill>
-                <a:srgbClr val="00B0F0"/>
-              </a:solidFill>
-              <a:effectLst/>
-              <a:latin typeface="Menlo" panose="020B0609030804020204" pitchFamily="49" charset="0"/>
-            </a:endParaRPr>
-          </a:p>
-          <a:p>
-            <a:pPr marL="914400" lvl="2" indent="0">
-              <a:buNone/>
-            </a:pPr>
-            <a:r>
-              <a:rPr lang="en" sz="1400" b="1" i="0" u="none" strike="noStrike" dirty="0">
-                <a:solidFill>
-                  <a:srgbClr val="00B0F0"/>
-                </a:solidFill>
-                <a:effectLst/>
-                <a:latin typeface="Menlo" panose="020B0609030804020204" pitchFamily="49" charset="0"/>
-              </a:rPr>
-              <a:t>done</a:t>
-            </a:r>
-            <a:r>
-              <a:rPr lang="en" sz="1400" b="0" i="0" u="none" strike="noStrike" dirty="0">
-                <a:solidFill>
-                  <a:srgbClr val="00B0F0"/>
-                </a:solidFill>
-                <a:effectLst/>
-                <a:latin typeface="Menlo" panose="020B0609030804020204" pitchFamily="49" charset="0"/>
-              </a:rPr>
-              <a:t> </a:t>
-            </a:r>
-            <a:endParaRPr lang="ru-RU" sz="1400" b="0" i="0" u="none" strike="noStrike" dirty="0">
-              <a:solidFill>
-                <a:srgbClr val="00B0F0"/>
-              </a:solidFill>
-              <a:effectLst/>
-              <a:latin typeface="Menlo" panose="020B0609030804020204" pitchFamily="49" charset="0"/>
-            </a:endParaRPr>
-          </a:p>
-          <a:p>
-            <a:pPr marL="914400" lvl="2" indent="0">
-              <a:buNone/>
-            </a:pPr>
-            <a:r>
-              <a:rPr lang="en" sz="1400" b="1" i="0" u="none" strike="noStrike" dirty="0">
-                <a:solidFill>
-                  <a:srgbClr val="00B0F0"/>
-                </a:solidFill>
-                <a:effectLst/>
-                <a:latin typeface="Menlo" panose="020B0609030804020204" pitchFamily="49" charset="0"/>
-              </a:rPr>
-              <a:t>for</a:t>
-            </a:r>
-            <a:r>
-              <a:rPr lang="en" sz="1400" b="0" i="0" u="none" strike="noStrike" dirty="0">
-                <a:solidFill>
-                  <a:srgbClr val="00B0F0"/>
-                </a:solidFill>
-                <a:effectLst/>
-                <a:latin typeface="Menlo" panose="020B0609030804020204" pitchFamily="49" charset="0"/>
-              </a:rPr>
-              <a:t> </a:t>
-            </a:r>
-            <a:r>
-              <a:rPr lang="en" sz="1400" b="0" i="0" u="none" strike="noStrike" dirty="0" err="1">
-                <a:solidFill>
-                  <a:srgbClr val="00B0F0"/>
-                </a:solidFill>
-                <a:effectLst/>
-                <a:latin typeface="Menlo" panose="020B0609030804020204" pitchFamily="49" charset="0"/>
-              </a:rPr>
-              <a:t>file_path</a:t>
-            </a:r>
-            <a:r>
-              <a:rPr lang="en" sz="1400" b="0" i="0" u="none" strike="noStrike" dirty="0">
-                <a:solidFill>
-                  <a:srgbClr val="00B0F0"/>
-                </a:solidFill>
-                <a:effectLst/>
-                <a:latin typeface="Menlo" panose="020B0609030804020204" pitchFamily="49" charset="0"/>
-              </a:rPr>
-              <a:t> </a:t>
-            </a:r>
-            <a:r>
-              <a:rPr lang="en" sz="1400" b="1" i="0" u="none" strike="noStrike" dirty="0">
-                <a:solidFill>
-                  <a:srgbClr val="00B0F0"/>
-                </a:solidFill>
-                <a:effectLst/>
-                <a:latin typeface="Menlo" panose="020B0609030804020204" pitchFamily="49" charset="0"/>
-              </a:rPr>
-              <a:t>in</a:t>
-            </a:r>
-            <a:r>
-              <a:rPr lang="en" sz="1400" b="0" i="0" u="none" strike="noStrike" dirty="0">
-                <a:solidFill>
-                  <a:srgbClr val="00B0F0"/>
-                </a:solidFill>
-                <a:effectLst/>
-                <a:latin typeface="Menlo" panose="020B0609030804020204" pitchFamily="49" charset="0"/>
-              </a:rPr>
-              <a:t> $(git diff --cached --name-only | grep ".swift$"); </a:t>
-            </a:r>
-            <a:r>
-              <a:rPr lang="en" sz="1400" b="1" i="0" u="none" strike="noStrike" dirty="0">
-                <a:solidFill>
-                  <a:srgbClr val="00B0F0"/>
-                </a:solidFill>
-                <a:effectLst/>
-                <a:latin typeface="Menlo" panose="020B0609030804020204" pitchFamily="49" charset="0"/>
-              </a:rPr>
-              <a:t>do</a:t>
-            </a:r>
-            <a:r>
-              <a:rPr lang="en" sz="1400" b="0" i="0" u="none" strike="noStrike" dirty="0">
-                <a:solidFill>
-                  <a:srgbClr val="00B0F0"/>
-                </a:solidFill>
-                <a:effectLst/>
-                <a:latin typeface="Menlo" panose="020B0609030804020204" pitchFamily="49" charset="0"/>
-              </a:rPr>
-              <a:t> </a:t>
-            </a:r>
-            <a:endParaRPr lang="ru-RU" sz="1400" b="0" i="0" u="none" strike="noStrike" dirty="0">
-              <a:solidFill>
-                <a:srgbClr val="00B0F0"/>
-              </a:solidFill>
-              <a:effectLst/>
-              <a:latin typeface="Menlo" panose="020B0609030804020204" pitchFamily="49" charset="0"/>
-            </a:endParaRPr>
-          </a:p>
-          <a:p>
-            <a:pPr marL="914400" lvl="2" indent="0">
-              <a:buNone/>
-            </a:pPr>
-            <a:r>
-              <a:rPr lang="ru-RU" sz="1400" dirty="0">
-                <a:solidFill>
-                  <a:srgbClr val="00B0F0"/>
-                </a:solidFill>
-                <a:latin typeface="Menlo" panose="020B0609030804020204" pitchFamily="49" charset="0"/>
-              </a:rPr>
-              <a:t>	</a:t>
-            </a:r>
-            <a:r>
-              <a:rPr lang="en" sz="1400" b="0" i="0" u="none" strike="noStrike" dirty="0">
-                <a:solidFill>
-                  <a:srgbClr val="00B0F0"/>
-                </a:solidFill>
-                <a:effectLst/>
-                <a:latin typeface="Menlo" panose="020B0609030804020204" pitchFamily="49" charset="0"/>
-              </a:rPr>
-              <a:t>export </a:t>
-            </a:r>
-            <a:r>
-              <a:rPr lang="en" sz="1400" b="0" i="0" u="none" strike="noStrike" dirty="0" err="1">
-                <a:solidFill>
-                  <a:srgbClr val="00B0F0"/>
-                </a:solidFill>
-                <a:effectLst/>
-                <a:latin typeface="Menlo" panose="020B0609030804020204" pitchFamily="49" charset="0"/>
-              </a:rPr>
-              <a:t>SCRIPT_INPUT_FILE_$count</a:t>
-            </a:r>
-            <a:r>
-              <a:rPr lang="en" sz="1400" b="0" i="0" u="none" strike="noStrike" dirty="0">
-                <a:solidFill>
-                  <a:srgbClr val="00B0F0"/>
-                </a:solidFill>
-                <a:effectLst/>
-                <a:latin typeface="Menlo" panose="020B0609030804020204" pitchFamily="49" charset="0"/>
-              </a:rPr>
-              <a:t>=$</a:t>
-            </a:r>
-            <a:r>
-              <a:rPr lang="en" sz="1400" b="0" i="0" u="none" strike="noStrike" dirty="0" err="1">
-                <a:solidFill>
-                  <a:srgbClr val="00B0F0"/>
-                </a:solidFill>
-                <a:effectLst/>
-                <a:latin typeface="Menlo" panose="020B0609030804020204" pitchFamily="49" charset="0"/>
-              </a:rPr>
-              <a:t>file_path</a:t>
-            </a:r>
-            <a:r>
-              <a:rPr lang="en" sz="1400" b="0" i="0" u="none" strike="noStrike" dirty="0">
-                <a:solidFill>
-                  <a:srgbClr val="00B0F0"/>
-                </a:solidFill>
-                <a:effectLst/>
-                <a:latin typeface="Menlo" panose="020B0609030804020204" pitchFamily="49" charset="0"/>
-              </a:rPr>
-              <a:t> </a:t>
-            </a:r>
-            <a:endParaRPr lang="ru-RU" sz="1400" b="0" i="0" u="none" strike="noStrike" dirty="0">
-              <a:solidFill>
-                <a:srgbClr val="00B0F0"/>
-              </a:solidFill>
-              <a:effectLst/>
-              <a:latin typeface="Menlo" panose="020B0609030804020204" pitchFamily="49" charset="0"/>
-            </a:endParaRPr>
-          </a:p>
-          <a:p>
-            <a:pPr marL="914400" lvl="2" indent="0">
-              <a:buNone/>
-            </a:pPr>
-            <a:r>
-              <a:rPr lang="ru-RU" sz="1400" dirty="0">
-                <a:solidFill>
-                  <a:srgbClr val="00B0F0"/>
-                </a:solidFill>
-                <a:latin typeface="Menlo" panose="020B0609030804020204" pitchFamily="49" charset="0"/>
-              </a:rPr>
-              <a:t>	</a:t>
-            </a:r>
-            <a:r>
-              <a:rPr lang="en" sz="1400" b="0" i="0" u="none" strike="noStrike" dirty="0">
-                <a:solidFill>
-                  <a:srgbClr val="00B0F0"/>
-                </a:solidFill>
-                <a:effectLst/>
-                <a:latin typeface="Menlo" panose="020B0609030804020204" pitchFamily="49" charset="0"/>
-              </a:rPr>
-              <a:t>count=$((count + 1)) </a:t>
-            </a:r>
-            <a:endParaRPr lang="ru-RU" sz="1400" b="0" i="0" u="none" strike="noStrike" dirty="0">
-              <a:solidFill>
-                <a:srgbClr val="00B0F0"/>
-              </a:solidFill>
-              <a:effectLst/>
-              <a:latin typeface="Menlo" panose="020B0609030804020204" pitchFamily="49" charset="0"/>
-            </a:endParaRPr>
-          </a:p>
-          <a:p>
-            <a:pPr marL="914400" lvl="2" indent="0">
-              <a:buNone/>
-            </a:pPr>
-            <a:r>
-              <a:rPr lang="en" sz="1400" b="1" i="0" u="none" strike="noStrike" dirty="0">
-                <a:solidFill>
-                  <a:srgbClr val="00B0F0"/>
-                </a:solidFill>
-                <a:effectLst/>
-                <a:latin typeface="Menlo" panose="020B0609030804020204" pitchFamily="49" charset="0"/>
-              </a:rPr>
-              <a:t>done</a:t>
-            </a:r>
-            <a:r>
-              <a:rPr lang="en" sz="1400" b="0" i="0" u="none" strike="noStrike" dirty="0">
-                <a:solidFill>
-                  <a:srgbClr val="00B0F0"/>
-                </a:solidFill>
-                <a:effectLst/>
-                <a:latin typeface="Menlo" panose="020B0609030804020204" pitchFamily="49" charset="0"/>
-              </a:rPr>
-              <a:t> </a:t>
-            </a:r>
-            <a:endParaRPr lang="ru-RU" sz="1400" b="0" i="0" u="none" strike="noStrike" dirty="0">
-              <a:solidFill>
-                <a:srgbClr val="00B0F0"/>
-              </a:solidFill>
-              <a:effectLst/>
-              <a:latin typeface="Menlo" panose="020B0609030804020204" pitchFamily="49" charset="0"/>
-            </a:endParaRPr>
-          </a:p>
-          <a:p>
-            <a:pPr marL="914400" lvl="2" indent="0">
-              <a:buNone/>
-            </a:pPr>
-            <a:r>
-              <a:rPr lang="ru-RU" sz="1400" dirty="0">
-                <a:solidFill>
-                  <a:srgbClr val="00B0F0"/>
-                </a:solidFill>
-                <a:latin typeface="Menlo" panose="020B0609030804020204" pitchFamily="49" charset="0"/>
-              </a:rPr>
-              <a:t>	</a:t>
-            </a:r>
-            <a:r>
-              <a:rPr lang="en" sz="1400" b="0" i="0" u="none" strike="noStrike" dirty="0">
-                <a:solidFill>
-                  <a:srgbClr val="00B0F0"/>
-                </a:solidFill>
-                <a:effectLst/>
-                <a:latin typeface="Menlo" panose="020B0609030804020204" pitchFamily="49" charset="0"/>
-              </a:rPr>
-              <a:t>export SCRIPT_INPUT_FILE_COUNT=$count </a:t>
-            </a:r>
-            <a:endParaRPr lang="ru-RU" sz="1400" b="0" i="0" u="none" strike="noStrike" dirty="0">
-              <a:solidFill>
-                <a:srgbClr val="00B0F0"/>
-              </a:solidFill>
-              <a:effectLst/>
-              <a:latin typeface="Menlo" panose="020B0609030804020204" pitchFamily="49" charset="0"/>
-            </a:endParaRPr>
-          </a:p>
-          <a:p>
-            <a:pPr marL="914400" lvl="2" indent="0">
-              <a:buNone/>
-            </a:pPr>
-            <a:r>
-              <a:rPr lang="ru-RU" sz="1400" b="0" i="0" u="none" strike="noStrike" dirty="0">
-                <a:solidFill>
-                  <a:srgbClr val="00B0F0"/>
-                </a:solidFill>
-                <a:effectLst/>
-                <a:latin typeface="Menlo" panose="020B0609030804020204" pitchFamily="49" charset="0"/>
-              </a:rPr>
-              <a:t>	</a:t>
-            </a:r>
-            <a:r>
-              <a:rPr lang="en" sz="1400" b="0" i="0" u="none" strike="noStrike" dirty="0" err="1">
-                <a:solidFill>
-                  <a:srgbClr val="00B0F0"/>
-                </a:solidFill>
-                <a:effectLst/>
-                <a:latin typeface="Menlo" panose="020B0609030804020204" pitchFamily="49" charset="0"/>
-              </a:rPr>
-              <a:t>swiftlint</a:t>
-            </a:r>
-            <a:r>
-              <a:rPr lang="en" sz="1400" b="0" i="0" u="none" strike="noStrike" dirty="0">
-                <a:solidFill>
-                  <a:srgbClr val="00B0F0"/>
-                </a:solidFill>
-                <a:effectLst/>
-                <a:latin typeface="Menlo" panose="020B0609030804020204" pitchFamily="49" charset="0"/>
-              </a:rPr>
-              <a:t> lint --use-script-input-files</a:t>
-            </a:r>
-            <a:endParaRPr lang="ru-RU" sz="1400" dirty="0">
+              <a:rPr lang="en" sz="2000" dirty="0">
+                <a:solidFill>
+                  <a:srgbClr val="00B0F0"/>
+                </a:solidFill>
+              </a:rPr>
+              <a:t>// </a:t>
+            </a:r>
+            <a:r>
+              <a:rPr lang="en" sz="2000" dirty="0" err="1">
+                <a:solidFill>
+                  <a:srgbClr val="00B0F0"/>
+                </a:solidFill>
+              </a:rPr>
+              <a:t>swiftlint:disable</a:t>
+            </a:r>
+            <a:r>
+              <a:rPr lang="en" sz="2000" dirty="0">
+                <a:solidFill>
+                  <a:srgbClr val="00B0F0"/>
+                </a:solidFill>
+              </a:rPr>
+              <a:t> &lt;rule1&gt; [&lt;rule2&gt; &lt;rule3&gt;...] </a:t>
+            </a:r>
+            <a:endParaRPr lang="ru-RU" sz="2000" dirty="0">
               <a:solidFill>
                 <a:srgbClr val="00B0F0"/>
               </a:solidFill>
             </a:endParaRPr>
           </a:p>
           <a:p>
-            <a:pPr lvl="1"/>
-            <a:endParaRPr lang="ru-RU" dirty="0"/>
+            <a:pPr marL="457200" lvl="1" indent="0">
+              <a:buNone/>
+            </a:pPr>
+            <a:r>
+              <a:rPr lang="ru-RU" sz="2000" dirty="0">
+                <a:solidFill>
+                  <a:srgbClr val="00B0F0"/>
+                </a:solidFill>
+              </a:rPr>
+              <a:t>	</a:t>
+            </a:r>
+            <a:r>
+              <a:rPr lang="en" sz="2000" dirty="0">
+                <a:solidFill>
+                  <a:srgbClr val="00B0F0"/>
+                </a:solidFill>
+              </a:rPr>
+              <a:t>......... </a:t>
+            </a:r>
+            <a:endParaRPr lang="ru-RU" sz="2000" dirty="0">
+              <a:solidFill>
+                <a:srgbClr val="00B0F0"/>
+              </a:solidFill>
+            </a:endParaRPr>
+          </a:p>
+          <a:p>
+            <a:pPr marL="457200" lvl="1" indent="0">
+              <a:buNone/>
+            </a:pPr>
+            <a:r>
+              <a:rPr lang="ru-RU" sz="2000" dirty="0">
+                <a:solidFill>
+                  <a:srgbClr val="00B0F0"/>
+                </a:solidFill>
+              </a:rPr>
+              <a:t>	</a:t>
+            </a:r>
+            <a:r>
+              <a:rPr lang="en" sz="2000" dirty="0">
+                <a:solidFill>
+                  <a:srgbClr val="00B0F0"/>
+                </a:solidFill>
+              </a:rPr>
+              <a:t>// </a:t>
+            </a:r>
+            <a:r>
+              <a:rPr lang="en" sz="2000" dirty="0" err="1">
+                <a:solidFill>
+                  <a:srgbClr val="00B0F0"/>
+                </a:solidFill>
+              </a:rPr>
+              <a:t>swiftlint:enable</a:t>
+            </a:r>
+            <a:r>
+              <a:rPr lang="en" sz="2000" dirty="0">
+                <a:solidFill>
+                  <a:srgbClr val="00B0F0"/>
+                </a:solidFill>
+              </a:rPr>
+              <a:t> &lt;rule1&gt; [&lt;rule2&gt; &lt;rule3&gt;...] </a:t>
+            </a:r>
+            <a:endParaRPr lang="ru-RU" sz="2000" dirty="0">
+              <a:solidFill>
+                <a:srgbClr val="00B0F0"/>
+              </a:solidFill>
+            </a:endParaRPr>
+          </a:p>
+          <a:p>
+            <a:pPr marL="457200" lvl="1" indent="0">
+              <a:buNone/>
+            </a:pPr>
+            <a:r>
+              <a:rPr lang="ru-RU" sz="2000" dirty="0">
+                <a:solidFill>
+                  <a:srgbClr val="00B0F0"/>
+                </a:solidFill>
+              </a:rPr>
+              <a:t>	</a:t>
+            </a:r>
+          </a:p>
+          <a:p>
+            <a:pPr marL="457200" lvl="1" indent="0">
+              <a:buNone/>
+            </a:pPr>
+            <a:r>
+              <a:rPr lang="ru-RU" sz="2000" dirty="0">
+                <a:solidFill>
+                  <a:srgbClr val="00B0F0"/>
+                </a:solidFill>
+              </a:rPr>
+              <a:t>	</a:t>
+            </a:r>
+            <a:r>
+              <a:rPr lang="en" sz="2000" dirty="0" err="1">
+                <a:solidFill>
+                  <a:srgbClr val="00B0F0"/>
+                </a:solidFill>
+              </a:rPr>
+              <a:t>func</a:t>
+            </a:r>
+            <a:r>
+              <a:rPr lang="en" sz="2000" dirty="0">
+                <a:solidFill>
+                  <a:srgbClr val="00B0F0"/>
+                </a:solidFill>
+              </a:rPr>
+              <a:t> </a:t>
+            </a:r>
+            <a:r>
+              <a:rPr lang="en" sz="2000" dirty="0" err="1">
+                <a:solidFill>
+                  <a:srgbClr val="00B0F0"/>
+                </a:solidFill>
+              </a:rPr>
+              <a:t>printName</a:t>
+            </a:r>
+            <a:r>
+              <a:rPr lang="en" sz="2000" dirty="0">
+                <a:solidFill>
+                  <a:srgbClr val="00B0F0"/>
+                </a:solidFill>
+              </a:rPr>
+              <a:t>() { </a:t>
+            </a:r>
+            <a:endParaRPr lang="ru-RU" sz="2000" dirty="0">
+              <a:solidFill>
+                <a:srgbClr val="00B0F0"/>
+              </a:solidFill>
+            </a:endParaRPr>
+          </a:p>
+          <a:p>
+            <a:pPr marL="457200" lvl="1" indent="0">
+              <a:buNone/>
+            </a:pPr>
+            <a:r>
+              <a:rPr lang="ru-RU" sz="2000" dirty="0">
+                <a:solidFill>
+                  <a:srgbClr val="00B0F0"/>
+                </a:solidFill>
+              </a:rPr>
+              <a:t>		</a:t>
+            </a:r>
+            <a:r>
+              <a:rPr lang="en" sz="2000" dirty="0">
+                <a:solidFill>
+                  <a:srgbClr val="00B0F0"/>
+                </a:solidFill>
+              </a:rPr>
+              <a:t>// </a:t>
+            </a:r>
+            <a:r>
+              <a:rPr lang="en" sz="2000" dirty="0" err="1">
+                <a:solidFill>
+                  <a:srgbClr val="00B0F0"/>
+                </a:solidFill>
+              </a:rPr>
+              <a:t>swiftlint:disable</a:t>
+            </a:r>
+            <a:r>
+              <a:rPr lang="en" sz="2000" dirty="0">
+                <a:solidFill>
+                  <a:srgbClr val="00B0F0"/>
+                </a:solidFill>
+              </a:rPr>
+              <a:t> </a:t>
+            </a:r>
+            <a:r>
+              <a:rPr lang="en" sz="2000" dirty="0" err="1">
+                <a:solidFill>
+                  <a:srgbClr val="00B0F0"/>
+                </a:solidFill>
+              </a:rPr>
+              <a:t>force_cast</a:t>
+            </a:r>
+            <a:r>
+              <a:rPr lang="en" sz="2000" dirty="0">
+                <a:solidFill>
+                  <a:srgbClr val="00B0F0"/>
+                </a:solidFill>
+              </a:rPr>
+              <a:t> </a:t>
+            </a:r>
+            <a:endParaRPr lang="ru-RU" sz="2000" dirty="0">
+              <a:solidFill>
+                <a:srgbClr val="00B0F0"/>
+              </a:solidFill>
+            </a:endParaRPr>
+          </a:p>
+          <a:p>
+            <a:pPr marL="457200" lvl="1" indent="0">
+              <a:buNone/>
+            </a:pPr>
+            <a:r>
+              <a:rPr lang="ru-RU" sz="2000" dirty="0">
+                <a:solidFill>
+                  <a:srgbClr val="00B0F0"/>
+                </a:solidFill>
+              </a:rPr>
+              <a:t>		</a:t>
+            </a:r>
+            <a:r>
+              <a:rPr lang="en" sz="2000" dirty="0">
+                <a:solidFill>
+                  <a:srgbClr val="00B0F0"/>
+                </a:solidFill>
+              </a:rPr>
+              <a:t>let name = </a:t>
+            </a:r>
+            <a:r>
+              <a:rPr lang="en" sz="2000" dirty="0" err="1">
+                <a:solidFill>
+                  <a:srgbClr val="00B0F0"/>
+                </a:solidFill>
+              </a:rPr>
+              <a:t>loadName</a:t>
+            </a:r>
+            <a:r>
+              <a:rPr lang="en" sz="2000" dirty="0">
+                <a:solidFill>
+                  <a:srgbClr val="00B0F0"/>
+                </a:solidFill>
+              </a:rPr>
+              <a:t>() as! String </a:t>
+            </a:r>
+            <a:endParaRPr lang="ru-RU" sz="2000" dirty="0">
+              <a:solidFill>
+                <a:srgbClr val="00B0F0"/>
+              </a:solidFill>
+            </a:endParaRPr>
+          </a:p>
+          <a:p>
+            <a:pPr marL="457200" lvl="1" indent="0">
+              <a:buNone/>
+            </a:pPr>
+            <a:r>
+              <a:rPr lang="ru-RU" sz="2000" dirty="0">
+                <a:solidFill>
+                  <a:srgbClr val="00B0F0"/>
+                </a:solidFill>
+              </a:rPr>
+              <a:t>		</a:t>
+            </a:r>
+            <a:r>
+              <a:rPr lang="en" sz="2000" dirty="0">
+                <a:solidFill>
+                  <a:srgbClr val="00B0F0"/>
+                </a:solidFill>
+              </a:rPr>
+              <a:t>// </a:t>
+            </a:r>
+            <a:r>
+              <a:rPr lang="en" sz="2000" dirty="0" err="1">
+                <a:solidFill>
+                  <a:srgbClr val="00B0F0"/>
+                </a:solidFill>
+              </a:rPr>
+              <a:t>swiftlint:enable</a:t>
+            </a:r>
+            <a:r>
+              <a:rPr lang="en" sz="2000" dirty="0">
+                <a:solidFill>
+                  <a:srgbClr val="00B0F0"/>
+                </a:solidFill>
+              </a:rPr>
+              <a:t> </a:t>
+            </a:r>
+            <a:r>
+              <a:rPr lang="en" sz="2000" dirty="0" err="1">
+                <a:solidFill>
+                  <a:srgbClr val="00B0F0"/>
+                </a:solidFill>
+              </a:rPr>
+              <a:t>force_cast</a:t>
+            </a:r>
+            <a:r>
+              <a:rPr lang="en" sz="2000" dirty="0">
+                <a:solidFill>
+                  <a:srgbClr val="00B0F0"/>
+                </a:solidFill>
+              </a:rPr>
+              <a:t> </a:t>
+            </a:r>
+            <a:endParaRPr lang="ru-RU" sz="2000" dirty="0">
+              <a:solidFill>
+                <a:srgbClr val="00B0F0"/>
+              </a:solidFill>
+            </a:endParaRPr>
+          </a:p>
+          <a:p>
+            <a:pPr marL="457200" lvl="1" indent="0">
+              <a:buNone/>
+            </a:pPr>
+            <a:r>
+              <a:rPr lang="ru-RU" sz="2000" dirty="0">
+                <a:solidFill>
+                  <a:srgbClr val="00B0F0"/>
+                </a:solidFill>
+              </a:rPr>
+              <a:t>		</a:t>
+            </a:r>
+            <a:r>
+              <a:rPr lang="en" sz="2000" dirty="0">
+                <a:solidFill>
+                  <a:srgbClr val="00B0F0"/>
+                </a:solidFill>
+              </a:rPr>
+              <a:t>print(name) </a:t>
+            </a:r>
+            <a:endParaRPr lang="ru-RU" sz="2000" dirty="0">
+              <a:solidFill>
+                <a:srgbClr val="00B0F0"/>
+              </a:solidFill>
+            </a:endParaRPr>
+          </a:p>
+          <a:p>
+            <a:pPr marL="457200" lvl="1" indent="0">
+              <a:buNone/>
+            </a:pPr>
+            <a:r>
+              <a:rPr lang="ru-RU" sz="2000" dirty="0">
+                <a:solidFill>
+                  <a:srgbClr val="00B0F0"/>
+                </a:solidFill>
+              </a:rPr>
+              <a:t>	</a:t>
+            </a:r>
+            <a:r>
+              <a:rPr lang="en" sz="2000" dirty="0">
+                <a:solidFill>
+                  <a:srgbClr val="00B0F0"/>
+                </a:solidFill>
+              </a:rPr>
+              <a:t>}</a:t>
+            </a:r>
+            <a:endParaRPr lang="ru-RU" sz="2000" dirty="0">
+              <a:solidFill>
+                <a:srgbClr val="00B0F0"/>
+              </a:solidFill>
+            </a:endParaRPr>
           </a:p>
         </p:txBody>
       </p:sp>
     </p:spTree>
     <p:extLst>
       <p:ext uri="{BB962C8B-B14F-4D97-AF65-F5344CB8AC3E}">
-        <p14:creationId xmlns:p14="http://schemas.microsoft.com/office/powerpoint/2010/main" val="2819899561"/>
+        <p14:creationId xmlns:p14="http://schemas.microsoft.com/office/powerpoint/2010/main" val="3135939333"/>
       </p:ext>
     </p:extLst>
   </p:cSld>
@@ -5132,7 +4494,7 @@
           <p:cNvPr id="2" name="Заголовок 1">
             <a:extLst>
               <a:ext uri="{FF2B5EF4-FFF2-40B4-BE49-F238E27FC236}">
-                <a16:creationId xmlns:a16="http://schemas.microsoft.com/office/drawing/2014/main" id="{31B897F7-0DCF-E745-B78C-D400FE6E3D18}"/>
+                <a16:creationId xmlns:a16="http://schemas.microsoft.com/office/drawing/2014/main" id="{DA04DAD3-50AA-BB44-B41F-1CAF57E5EFA3}"/>
               </a:ext>
             </a:extLst>
           </p:cNvPr>
@@ -5149,13 +4511,19 @@
           <a:lstStyle/>
           <a:p>
             <a:r>
-              <a:rPr lang="ru-RU" dirty="0">
+              <a:rPr lang="ru-RU" b="1" i="0" u="none" strike="noStrike" dirty="0">
                 <a:solidFill>
                   <a:srgbClr val="7030A0"/>
                 </a:solidFill>
-              </a:rPr>
-              <a:t>Итог</a:t>
-            </a:r>
+                <a:effectLst/>
+              </a:rPr>
+              <a:t>Скорость сборки проекта</a:t>
+            </a:r>
+            <a:endParaRPr lang="ru-RU" dirty="0">
+              <a:solidFill>
+                <a:srgbClr val="7030A0"/>
+              </a:solidFill>
+            </a:endParaRPr>
           </a:p>
         </p:txBody>
       </p:sp>
@@ -5164,7 +4532,7 @@
           <p:cNvPr id="3" name="Объект 2">
             <a:extLst>
               <a:ext uri="{FF2B5EF4-FFF2-40B4-BE49-F238E27FC236}">
-                <a16:creationId xmlns:a16="http://schemas.microsoft.com/office/drawing/2014/main" id="{65F95F4C-C842-E64F-9E8C-3F671E7857A7}"/>
+                <a16:creationId xmlns:a16="http://schemas.microsoft.com/office/drawing/2014/main" id="{27B34F77-AF9C-A748-B7D5-7DCE6941CA4B}"/>
               </a:ext>
             </a:extLst>
           </p:cNvPr>
@@ -5175,42 +4543,71 @@
             <p:ph idx="1"/>
           </p:nvPr>
         </p:nvSpPr>
-        <p:spPr/>
-        <p:txBody>
-          <a:bodyPr/>
+        <p:spPr>
+          <a:xfrm>
+            <a:off x="838200" y="1825624"/>
+            <a:ext cx="10515600" cy="4782993"/>
+          </a:xfrm>
+        </p:spPr>
+        <p:txBody>
+          <a:bodyPr>
+            <a:normAutofit lnSpcReduction="10000"/>
+          </a:bodyPr>
           <a:lstStyle/>
           <a:p>
             <a:r>
-              <a:rPr lang="en-US" dirty="0" err="1">
-                <a:solidFill>
-                  <a:srgbClr val="FFFF00"/>
-                </a:solidFill>
+              <a:rPr lang="ru-RU" b="0" i="0" u="none" strike="noStrike" dirty="0">
+                <a:solidFill>
+                  <a:srgbClr val="FFFF00"/>
+                </a:solidFill>
+                <a:effectLst/>
+              </a:rPr>
+              <a:t>Очевидно, что использование </a:t>
+            </a:r>
+            <a:r>
+              <a:rPr lang="en" b="0" i="0" u="none" strike="noStrike" dirty="0" err="1">
+                <a:solidFill>
+                  <a:srgbClr val="FFFF00"/>
+                </a:solidFill>
+                <a:effectLst/>
               </a:rPr>
               <a:t>SwiftLint</a:t>
             </a:r>
             <a:r>
-              <a:rPr lang="en-US" dirty="0">
-                <a:solidFill>
-                  <a:srgbClr val="FFFF00"/>
-                </a:solidFill>
+              <a:rPr lang="en" b="0" i="0" u="none" strike="noStrike" dirty="0">
+                <a:solidFill>
+                  <a:srgbClr val="FFFF00"/>
+                </a:solidFill>
+                <a:effectLst/>
               </a:rPr>
               <a:t> </a:t>
             </a:r>
             <a:r>
-              <a:rPr lang="ru-RU" dirty="0">
-                <a:solidFill>
-                  <a:srgbClr val="FFFF00"/>
-                </a:solidFill>
-              </a:rPr>
-              <a:t>нужен</a:t>
-            </a:r>
-            <a:r>
-              <a:rPr lang="ru-RU" dirty="0"/>
-              <a:t> для того, чтобы</a:t>
-            </a:r>
-            <a:r>
-              <a:rPr lang="en-US" dirty="0"/>
-              <a:t>:</a:t>
+              <a:rPr lang="ru-RU" b="0" i="0" u="none" strike="noStrike" dirty="0">
+                <a:solidFill>
+                  <a:srgbClr val="FFFF00"/>
+                </a:solidFill>
+                <a:effectLst/>
+              </a:rPr>
+              <a:t>требует дополнительного времени при сборке проекта. Если скорость сборки заметно проседает, стоит задуматься о проверке только измененных файлов. Для этого нужно заменить скрипт проверки в </a:t>
+            </a:r>
+            <a:r>
+              <a:rPr lang="en" b="0" i="0" u="none" strike="noStrike" dirty="0">
+                <a:solidFill>
+                  <a:srgbClr val="FFFF00"/>
+                </a:solidFill>
+                <a:effectLst/>
+              </a:rPr>
+              <a:t>Build Phases </a:t>
+            </a:r>
+            <a:r>
+              <a:rPr lang="ru-RU" b="0" i="0" u="none" strike="noStrike" dirty="0">
+                <a:solidFill>
+                  <a:srgbClr val="FFFF00"/>
+                </a:solidFill>
+                <a:effectLst/>
+              </a:rPr>
+              <a:t>на:</a:t>
             </a:r>
           </a:p>
           <a:p>
@@ -5218,86 +4615,587 @@
               <a:buNone/>
             </a:pPr>
             <a:r>
-              <a:rPr lang="en-US" dirty="0"/>
-              <a:t>	1) </a:t>
-            </a:r>
-            <a:r>
-              <a:rPr lang="ru-RU" dirty="0">
-                <a:solidFill>
-                  <a:srgbClr val="FFFF00"/>
-                </a:solidFill>
-              </a:rPr>
-              <a:t>Тратить меньше времени на код-</a:t>
-            </a:r>
-            <a:r>
-              <a:rPr lang="ru-RU" dirty="0" err="1">
-                <a:solidFill>
-                  <a:srgbClr val="FFFF00"/>
-                </a:solidFill>
-              </a:rPr>
-              <a:t>ревью</a:t>
-            </a:r>
-            <a:r>
-              <a:rPr lang="ru-RU" dirty="0"/>
-              <a:t> при работе в команде, над объемными проектами</a:t>
-            </a:r>
-          </a:p>
-          <a:p>
-            <a:pPr marL="457200" lvl="1" indent="0">
+              <a:rPr lang="ru-RU" sz="1700" b="0" i="0" u="none" strike="noStrike" dirty="0">
+                <a:solidFill>
+                  <a:srgbClr val="00B0F0"/>
+                </a:solidFill>
+                <a:effectLst/>
+                <a:latin typeface="Menlo" panose="020B0609030804020204" pitchFamily="49" charset="0"/>
+              </a:rPr>
+              <a:t>	</a:t>
+            </a:r>
+            <a:r>
+              <a:rPr lang="en" sz="1400" b="0" i="0" u="none" strike="noStrike" dirty="0">
+                <a:solidFill>
+                  <a:srgbClr val="00B0F0"/>
+                </a:solidFill>
+                <a:effectLst/>
+                <a:latin typeface="Menlo" panose="020B0609030804020204" pitchFamily="49" charset="0"/>
+              </a:rPr>
+              <a:t>count=0 </a:t>
+            </a:r>
+            <a:endParaRPr lang="ru-RU" sz="1400" b="0" i="0" u="none" strike="noStrike" dirty="0">
+              <a:solidFill>
+                <a:srgbClr val="00B0F0"/>
+              </a:solidFill>
+              <a:effectLst/>
+              <a:latin typeface="Menlo" panose="020B0609030804020204" pitchFamily="49" charset="0"/>
+            </a:endParaRPr>
+          </a:p>
+          <a:p>
+            <a:pPr marL="914400" lvl="2" indent="0">
               <a:buNone/>
             </a:pPr>
             <a:r>
-              <a:rPr lang="ru-RU" dirty="0"/>
-              <a:t>	2) </a:t>
-            </a:r>
-            <a:r>
-              <a:rPr lang="ru-RU" dirty="0">
-                <a:solidFill>
-                  <a:srgbClr val="FFFF00"/>
-                </a:solidFill>
-              </a:rPr>
-              <a:t>Придерживаться единого </a:t>
-            </a:r>
-            <a:r>
-              <a:rPr lang="en" dirty="0">
-                <a:solidFill>
-                  <a:srgbClr val="FFFF00"/>
-                </a:solidFill>
-              </a:rPr>
-              <a:t>Code Style</a:t>
-            </a:r>
-          </a:p>
-          <a:p>
-            <a:pPr marL="457200" lvl="1" indent="0">
+              <a:rPr lang="en" sz="1400" b="1" i="0" u="none" strike="noStrike" dirty="0">
+                <a:solidFill>
+                  <a:srgbClr val="00B0F0"/>
+                </a:solidFill>
+                <a:effectLst/>
+                <a:latin typeface="Menlo" panose="020B0609030804020204" pitchFamily="49" charset="0"/>
+              </a:rPr>
+              <a:t>for</a:t>
+            </a:r>
+            <a:r>
+              <a:rPr lang="en" sz="1400" b="0" i="0" u="none" strike="noStrike" dirty="0">
+                <a:solidFill>
+                  <a:srgbClr val="00B0F0"/>
+                </a:solidFill>
+                <a:effectLst/>
+                <a:latin typeface="Menlo" panose="020B0609030804020204" pitchFamily="49" charset="0"/>
+              </a:rPr>
+              <a:t> </a:t>
+            </a:r>
+            <a:r>
+              <a:rPr lang="en" sz="1400" b="0" i="0" u="none" strike="noStrike" dirty="0" err="1">
+                <a:solidFill>
+                  <a:srgbClr val="00B0F0"/>
+                </a:solidFill>
+                <a:effectLst/>
+                <a:latin typeface="Menlo" panose="020B0609030804020204" pitchFamily="49" charset="0"/>
+              </a:rPr>
+              <a:t>file_path</a:t>
+            </a:r>
+            <a:r>
+              <a:rPr lang="en" sz="1400" b="0" i="0" u="none" strike="noStrike" dirty="0">
+                <a:solidFill>
+                  <a:srgbClr val="00B0F0"/>
+                </a:solidFill>
+                <a:effectLst/>
+                <a:latin typeface="Menlo" panose="020B0609030804020204" pitchFamily="49" charset="0"/>
+              </a:rPr>
+              <a:t> </a:t>
+            </a:r>
+            <a:r>
+              <a:rPr lang="en" sz="1400" b="1" i="0" u="none" strike="noStrike" dirty="0">
+                <a:solidFill>
+                  <a:srgbClr val="00B0F0"/>
+                </a:solidFill>
+                <a:effectLst/>
+                <a:latin typeface="Menlo" panose="020B0609030804020204" pitchFamily="49" charset="0"/>
+              </a:rPr>
+              <a:t>in</a:t>
+            </a:r>
+            <a:r>
+              <a:rPr lang="en" sz="1400" b="0" i="0" u="none" strike="noStrike" dirty="0">
+                <a:solidFill>
+                  <a:srgbClr val="00B0F0"/>
+                </a:solidFill>
+                <a:effectLst/>
+                <a:latin typeface="Menlo" panose="020B0609030804020204" pitchFamily="49" charset="0"/>
+              </a:rPr>
+              <a:t> $(git ls-files -om --exclude-from=.</a:t>
+            </a:r>
+            <a:r>
+              <a:rPr lang="en" sz="1400" b="0" i="0" u="none" strike="noStrike" dirty="0" err="1">
+                <a:solidFill>
+                  <a:srgbClr val="00B0F0"/>
+                </a:solidFill>
+                <a:effectLst/>
+                <a:latin typeface="Menlo" panose="020B0609030804020204" pitchFamily="49" charset="0"/>
+              </a:rPr>
+              <a:t>gitignore</a:t>
+            </a:r>
+            <a:r>
+              <a:rPr lang="en" sz="1400" b="0" i="0" u="none" strike="noStrike" dirty="0">
+                <a:solidFill>
+                  <a:srgbClr val="00B0F0"/>
+                </a:solidFill>
+                <a:effectLst/>
+                <a:latin typeface="Menlo" panose="020B0609030804020204" pitchFamily="49" charset="0"/>
+              </a:rPr>
+              <a:t> | grep ".swift$"); </a:t>
+            </a:r>
+            <a:r>
+              <a:rPr lang="en" sz="1400" b="1" i="0" u="none" strike="noStrike" dirty="0">
+                <a:solidFill>
+                  <a:srgbClr val="00B0F0"/>
+                </a:solidFill>
+                <a:effectLst/>
+                <a:latin typeface="Menlo" panose="020B0609030804020204" pitchFamily="49" charset="0"/>
+              </a:rPr>
+              <a:t>do</a:t>
+            </a:r>
+            <a:r>
+              <a:rPr lang="en" sz="1400" b="0" i="0" u="none" strike="noStrike" dirty="0">
+                <a:solidFill>
+                  <a:srgbClr val="00B0F0"/>
+                </a:solidFill>
+                <a:effectLst/>
+                <a:latin typeface="Menlo" panose="020B0609030804020204" pitchFamily="49" charset="0"/>
+              </a:rPr>
+              <a:t> </a:t>
+            </a:r>
+            <a:endParaRPr lang="ru-RU" sz="1400" b="0" i="0" u="none" strike="noStrike" dirty="0">
+              <a:solidFill>
+                <a:srgbClr val="00B0F0"/>
+              </a:solidFill>
+              <a:effectLst/>
+              <a:latin typeface="Menlo" panose="020B0609030804020204" pitchFamily="49" charset="0"/>
+            </a:endParaRPr>
+          </a:p>
+          <a:p>
+            <a:pPr marL="914400" lvl="2" indent="0">
               <a:buNone/>
             </a:pPr>
             <a:r>
-              <a:rPr lang="en" dirty="0">
-                <a:solidFill>
-                  <a:srgbClr val="FFFF00"/>
-                </a:solidFill>
+              <a:rPr lang="ru-RU" sz="1400" b="0" i="0" u="none" strike="noStrike" dirty="0">
+                <a:solidFill>
+                  <a:srgbClr val="00B0F0"/>
+                </a:solidFill>
+                <a:effectLst/>
+                <a:latin typeface="Menlo" panose="020B0609030804020204" pitchFamily="49" charset="0"/>
               </a:rPr>
               <a:t>	</a:t>
             </a:r>
             <a:r>
-              <a:rPr lang="en" dirty="0"/>
-              <a:t>3) </a:t>
-            </a:r>
-            <a:r>
-              <a:rPr lang="ru-RU" dirty="0">
-                <a:solidFill>
-                  <a:srgbClr val="FFFF00"/>
-                </a:solidFill>
-              </a:rPr>
-              <a:t>Повысить качество кода</a:t>
-            </a:r>
+              <a:rPr lang="en" sz="1400" b="0" i="0" u="none" strike="noStrike" dirty="0">
+                <a:solidFill>
+                  <a:srgbClr val="00B0F0"/>
+                </a:solidFill>
+                <a:effectLst/>
+                <a:latin typeface="Menlo" panose="020B0609030804020204" pitchFamily="49" charset="0"/>
+              </a:rPr>
+              <a:t>export </a:t>
+            </a:r>
+            <a:r>
+              <a:rPr lang="en" sz="1400" b="0" i="0" u="none" strike="noStrike" dirty="0" err="1">
+                <a:solidFill>
+                  <a:srgbClr val="00B0F0"/>
+                </a:solidFill>
+                <a:effectLst/>
+                <a:latin typeface="Menlo" panose="020B0609030804020204" pitchFamily="49" charset="0"/>
+              </a:rPr>
+              <a:t>SCRIPT_INPUT_FILE_$count</a:t>
+            </a:r>
+            <a:r>
+              <a:rPr lang="en" sz="1400" b="0" i="0" u="none" strike="noStrike" dirty="0">
+                <a:solidFill>
+                  <a:srgbClr val="00B0F0"/>
+                </a:solidFill>
+                <a:effectLst/>
+                <a:latin typeface="Menlo" panose="020B0609030804020204" pitchFamily="49" charset="0"/>
+              </a:rPr>
+              <a:t>=$</a:t>
+            </a:r>
+            <a:r>
+              <a:rPr lang="en" sz="1400" b="0" i="0" u="none" strike="noStrike" dirty="0" err="1">
+                <a:solidFill>
+                  <a:srgbClr val="00B0F0"/>
+                </a:solidFill>
+                <a:effectLst/>
+                <a:latin typeface="Menlo" panose="020B0609030804020204" pitchFamily="49" charset="0"/>
+              </a:rPr>
+              <a:t>file_path</a:t>
+            </a:r>
+            <a:r>
+              <a:rPr lang="en" sz="1400" b="0" i="0" u="none" strike="noStrike" dirty="0">
+                <a:solidFill>
+                  <a:srgbClr val="00B0F0"/>
+                </a:solidFill>
+                <a:effectLst/>
+                <a:latin typeface="Menlo" panose="020B0609030804020204" pitchFamily="49" charset="0"/>
+              </a:rPr>
+              <a:t> </a:t>
+            </a:r>
+            <a:endParaRPr lang="ru-RU" sz="1400" b="0" i="0" u="none" strike="noStrike" dirty="0">
+              <a:solidFill>
+                <a:srgbClr val="00B0F0"/>
+              </a:solidFill>
+              <a:effectLst/>
+              <a:latin typeface="Menlo" panose="020B0609030804020204" pitchFamily="49" charset="0"/>
+            </a:endParaRPr>
+          </a:p>
+          <a:p>
+            <a:pPr marL="914400" lvl="2" indent="0">
+              <a:buNone/>
+            </a:pPr>
+            <a:r>
+              <a:rPr lang="ru-RU" sz="1400" dirty="0">
+                <a:solidFill>
+                  <a:srgbClr val="00B0F0"/>
+                </a:solidFill>
+                <a:latin typeface="Menlo" panose="020B0609030804020204" pitchFamily="49" charset="0"/>
+              </a:rPr>
+              <a:t>	</a:t>
+            </a:r>
+            <a:r>
+              <a:rPr lang="en" sz="1400" b="0" i="0" u="none" strike="noStrike" dirty="0">
+                <a:solidFill>
+                  <a:srgbClr val="00B0F0"/>
+                </a:solidFill>
+                <a:effectLst/>
+                <a:latin typeface="Menlo" panose="020B0609030804020204" pitchFamily="49" charset="0"/>
+              </a:rPr>
+              <a:t>count=$((count + 1)) </a:t>
+            </a:r>
+            <a:endParaRPr lang="ru-RU" sz="1400" b="0" i="0" u="none" strike="noStrike" dirty="0">
+              <a:solidFill>
+                <a:srgbClr val="00B0F0"/>
+              </a:solidFill>
+              <a:effectLst/>
+              <a:latin typeface="Menlo" panose="020B0609030804020204" pitchFamily="49" charset="0"/>
+            </a:endParaRPr>
+          </a:p>
+          <a:p>
+            <a:pPr marL="914400" lvl="2" indent="0">
+              <a:buNone/>
+            </a:pPr>
+            <a:r>
+              <a:rPr lang="en" sz="1400" b="1" i="0" u="none" strike="noStrike" dirty="0">
+                <a:solidFill>
+                  <a:srgbClr val="00B0F0"/>
+                </a:solidFill>
+                <a:effectLst/>
+                <a:latin typeface="Menlo" panose="020B0609030804020204" pitchFamily="49" charset="0"/>
+              </a:rPr>
+              <a:t>done</a:t>
+            </a:r>
+            <a:r>
+              <a:rPr lang="en" sz="1400" b="0" i="0" u="none" strike="noStrike" dirty="0">
+                <a:solidFill>
+                  <a:srgbClr val="00B0F0"/>
+                </a:solidFill>
+                <a:effectLst/>
+                <a:latin typeface="Menlo" panose="020B0609030804020204" pitchFamily="49" charset="0"/>
+              </a:rPr>
+              <a:t> </a:t>
+            </a:r>
+            <a:endParaRPr lang="ru-RU" sz="1400" b="0" i="0" u="none" strike="noStrike" dirty="0">
+              <a:solidFill>
+                <a:srgbClr val="00B0F0"/>
+              </a:solidFill>
+              <a:effectLst/>
+              <a:latin typeface="Menlo" panose="020B0609030804020204" pitchFamily="49" charset="0"/>
+            </a:endParaRPr>
+          </a:p>
+          <a:p>
+            <a:pPr marL="914400" lvl="2" indent="0">
+              <a:buNone/>
+            </a:pPr>
+            <a:r>
+              <a:rPr lang="en" sz="1400" b="1" i="0" u="none" strike="noStrike" dirty="0">
+                <a:solidFill>
+                  <a:srgbClr val="00B0F0"/>
+                </a:solidFill>
+                <a:effectLst/>
+                <a:latin typeface="Menlo" panose="020B0609030804020204" pitchFamily="49" charset="0"/>
+              </a:rPr>
+              <a:t>for</a:t>
+            </a:r>
+            <a:r>
+              <a:rPr lang="en" sz="1400" b="0" i="0" u="none" strike="noStrike" dirty="0">
+                <a:solidFill>
+                  <a:srgbClr val="00B0F0"/>
+                </a:solidFill>
+                <a:effectLst/>
+                <a:latin typeface="Menlo" panose="020B0609030804020204" pitchFamily="49" charset="0"/>
+              </a:rPr>
+              <a:t> </a:t>
+            </a:r>
+            <a:r>
+              <a:rPr lang="en" sz="1400" b="0" i="0" u="none" strike="noStrike" dirty="0" err="1">
+                <a:solidFill>
+                  <a:srgbClr val="00B0F0"/>
+                </a:solidFill>
+                <a:effectLst/>
+                <a:latin typeface="Menlo" panose="020B0609030804020204" pitchFamily="49" charset="0"/>
+              </a:rPr>
+              <a:t>file_path</a:t>
+            </a:r>
+            <a:r>
+              <a:rPr lang="en" sz="1400" b="0" i="0" u="none" strike="noStrike" dirty="0">
+                <a:solidFill>
+                  <a:srgbClr val="00B0F0"/>
+                </a:solidFill>
+                <a:effectLst/>
+                <a:latin typeface="Menlo" panose="020B0609030804020204" pitchFamily="49" charset="0"/>
+              </a:rPr>
+              <a:t> </a:t>
+            </a:r>
+            <a:r>
+              <a:rPr lang="en" sz="1400" b="1" i="0" u="none" strike="noStrike" dirty="0">
+                <a:solidFill>
+                  <a:srgbClr val="00B0F0"/>
+                </a:solidFill>
+                <a:effectLst/>
+                <a:latin typeface="Menlo" panose="020B0609030804020204" pitchFamily="49" charset="0"/>
+              </a:rPr>
+              <a:t>in</a:t>
+            </a:r>
+            <a:r>
+              <a:rPr lang="en" sz="1400" b="0" i="0" u="none" strike="noStrike" dirty="0">
+                <a:solidFill>
+                  <a:srgbClr val="00B0F0"/>
+                </a:solidFill>
+                <a:effectLst/>
+                <a:latin typeface="Menlo" panose="020B0609030804020204" pitchFamily="49" charset="0"/>
+              </a:rPr>
+              <a:t> $(git diff --cached --name-only | grep ".swift$"); </a:t>
+            </a:r>
+            <a:r>
+              <a:rPr lang="en" sz="1400" b="1" i="0" u="none" strike="noStrike" dirty="0">
+                <a:solidFill>
+                  <a:srgbClr val="00B0F0"/>
+                </a:solidFill>
+                <a:effectLst/>
+                <a:latin typeface="Menlo" panose="020B0609030804020204" pitchFamily="49" charset="0"/>
+              </a:rPr>
+              <a:t>do</a:t>
+            </a:r>
+            <a:r>
+              <a:rPr lang="en" sz="1400" b="0" i="0" u="none" strike="noStrike" dirty="0">
+                <a:solidFill>
+                  <a:srgbClr val="00B0F0"/>
+                </a:solidFill>
+                <a:effectLst/>
+                <a:latin typeface="Menlo" panose="020B0609030804020204" pitchFamily="49" charset="0"/>
+              </a:rPr>
+              <a:t> </a:t>
+            </a:r>
+            <a:endParaRPr lang="ru-RU" sz="1400" b="0" i="0" u="none" strike="noStrike" dirty="0">
+              <a:solidFill>
+                <a:srgbClr val="00B0F0"/>
+              </a:solidFill>
+              <a:effectLst/>
+              <a:latin typeface="Menlo" panose="020B0609030804020204" pitchFamily="49" charset="0"/>
+            </a:endParaRPr>
+          </a:p>
+          <a:p>
+            <a:pPr marL="914400" lvl="2" indent="0">
+              <a:buNone/>
+            </a:pPr>
+            <a:r>
+              <a:rPr lang="ru-RU" sz="1400" dirty="0">
+                <a:solidFill>
+                  <a:srgbClr val="00B0F0"/>
+                </a:solidFill>
+                <a:latin typeface="Menlo" panose="020B0609030804020204" pitchFamily="49" charset="0"/>
+              </a:rPr>
+              <a:t>	</a:t>
+            </a:r>
+            <a:r>
+              <a:rPr lang="en" sz="1400" b="0" i="0" u="none" strike="noStrike" dirty="0">
+                <a:solidFill>
+                  <a:srgbClr val="00B0F0"/>
+                </a:solidFill>
+                <a:effectLst/>
+                <a:latin typeface="Menlo" panose="020B0609030804020204" pitchFamily="49" charset="0"/>
+              </a:rPr>
+              <a:t>export </a:t>
+            </a:r>
+            <a:r>
+              <a:rPr lang="en" sz="1400" b="0" i="0" u="none" strike="noStrike" dirty="0" err="1">
+                <a:solidFill>
+                  <a:srgbClr val="00B0F0"/>
+                </a:solidFill>
+                <a:effectLst/>
+                <a:latin typeface="Menlo" panose="020B0609030804020204" pitchFamily="49" charset="0"/>
+              </a:rPr>
+              <a:t>SCRIPT_INPUT_FILE_$count</a:t>
+            </a:r>
+            <a:r>
+              <a:rPr lang="en" sz="1400" b="0" i="0" u="none" strike="noStrike" dirty="0">
+                <a:solidFill>
+                  <a:srgbClr val="00B0F0"/>
+                </a:solidFill>
+                <a:effectLst/>
+                <a:latin typeface="Menlo" panose="020B0609030804020204" pitchFamily="49" charset="0"/>
+              </a:rPr>
+              <a:t>=$</a:t>
+            </a:r>
+            <a:r>
+              <a:rPr lang="en" sz="1400" b="0" i="0" u="none" strike="noStrike" dirty="0" err="1">
+                <a:solidFill>
+                  <a:srgbClr val="00B0F0"/>
+                </a:solidFill>
+                <a:effectLst/>
+                <a:latin typeface="Menlo" panose="020B0609030804020204" pitchFamily="49" charset="0"/>
+              </a:rPr>
+              <a:t>file_path</a:t>
+            </a:r>
+            <a:r>
+              <a:rPr lang="en" sz="1400" b="0" i="0" u="none" strike="noStrike" dirty="0">
+                <a:solidFill>
+                  <a:srgbClr val="00B0F0"/>
+                </a:solidFill>
+                <a:effectLst/>
+                <a:latin typeface="Menlo" panose="020B0609030804020204" pitchFamily="49" charset="0"/>
+              </a:rPr>
+              <a:t> </a:t>
+            </a:r>
+            <a:endParaRPr lang="ru-RU" sz="1400" b="0" i="0" u="none" strike="noStrike" dirty="0">
+              <a:solidFill>
+                <a:srgbClr val="00B0F0"/>
+              </a:solidFill>
+              <a:effectLst/>
+              <a:latin typeface="Menlo" panose="020B0609030804020204" pitchFamily="49" charset="0"/>
+            </a:endParaRPr>
+          </a:p>
+          <a:p>
+            <a:pPr marL="914400" lvl="2" indent="0">
+              <a:buNone/>
+            </a:pPr>
+            <a:r>
+              <a:rPr lang="ru-RU" sz="1400" dirty="0">
+                <a:solidFill>
+                  <a:srgbClr val="00B0F0"/>
+                </a:solidFill>
+                <a:latin typeface="Menlo" panose="020B0609030804020204" pitchFamily="49" charset="0"/>
+              </a:rPr>
+              <a:t>	</a:t>
+            </a:r>
+            <a:r>
+              <a:rPr lang="en" sz="1400" b="0" i="0" u="none" strike="noStrike" dirty="0">
+                <a:solidFill>
+                  <a:srgbClr val="00B0F0"/>
+                </a:solidFill>
+                <a:effectLst/>
+                <a:latin typeface="Menlo" panose="020B0609030804020204" pitchFamily="49" charset="0"/>
+              </a:rPr>
+              <a:t>count=$((count + 1)) </a:t>
+            </a:r>
+            <a:endParaRPr lang="ru-RU" sz="1400" b="0" i="0" u="none" strike="noStrike" dirty="0">
+              <a:solidFill>
+                <a:srgbClr val="00B0F0"/>
+              </a:solidFill>
+              <a:effectLst/>
+              <a:latin typeface="Menlo" panose="020B0609030804020204" pitchFamily="49" charset="0"/>
+            </a:endParaRPr>
+          </a:p>
+          <a:p>
+            <a:pPr marL="914400" lvl="2" indent="0">
+              <a:buNone/>
+            </a:pPr>
+            <a:r>
+              <a:rPr lang="en" sz="1400" b="1" i="0" u="none" strike="noStrike" dirty="0">
+                <a:solidFill>
+                  <a:srgbClr val="00B0F0"/>
+                </a:solidFill>
+                <a:effectLst/>
+                <a:latin typeface="Menlo" panose="020B0609030804020204" pitchFamily="49" charset="0"/>
+              </a:rPr>
+              <a:t>done</a:t>
+            </a:r>
+            <a:r>
+              <a:rPr lang="en" sz="1400" b="0" i="0" u="none" strike="noStrike" dirty="0">
+                <a:solidFill>
+                  <a:srgbClr val="00B0F0"/>
+                </a:solidFill>
+                <a:effectLst/>
+                <a:latin typeface="Menlo" panose="020B0609030804020204" pitchFamily="49" charset="0"/>
+              </a:rPr>
+              <a:t> </a:t>
+            </a:r>
+            <a:endParaRPr lang="ru-RU" sz="1400" b="0" i="0" u="none" strike="noStrike" dirty="0">
+              <a:solidFill>
+                <a:srgbClr val="00B0F0"/>
+              </a:solidFill>
+              <a:effectLst/>
+              <a:latin typeface="Menlo" panose="020B0609030804020204" pitchFamily="49" charset="0"/>
+            </a:endParaRPr>
+          </a:p>
+          <a:p>
+            <a:pPr marL="914400" lvl="2" indent="0">
+              <a:buNone/>
+            </a:pPr>
+            <a:r>
+              <a:rPr lang="ru-RU" sz="1400" dirty="0">
+                <a:solidFill>
+                  <a:srgbClr val="00B0F0"/>
+                </a:solidFill>
+                <a:latin typeface="Menlo" panose="020B0609030804020204" pitchFamily="49" charset="0"/>
+              </a:rPr>
+              <a:t>	</a:t>
+            </a:r>
+            <a:r>
+              <a:rPr lang="en" sz="1400" b="0" i="0" u="none" strike="noStrike" dirty="0">
+                <a:solidFill>
+                  <a:srgbClr val="00B0F0"/>
+                </a:solidFill>
+                <a:effectLst/>
+                <a:latin typeface="Menlo" panose="020B0609030804020204" pitchFamily="49" charset="0"/>
+              </a:rPr>
+              <a:t>export SCRIPT_INPUT_FILE_COUNT=$count </a:t>
+            </a:r>
+            <a:endParaRPr lang="ru-RU" sz="1400" b="0" i="0" u="none" strike="noStrike" dirty="0">
+              <a:solidFill>
+                <a:srgbClr val="00B0F0"/>
+              </a:solidFill>
+              <a:effectLst/>
+              <a:latin typeface="Menlo" panose="020B0609030804020204" pitchFamily="49" charset="0"/>
+            </a:endParaRPr>
+          </a:p>
+          <a:p>
+            <a:pPr marL="914400" lvl="2" indent="0">
+              <a:buNone/>
+            </a:pPr>
+            <a:r>
+              <a:rPr lang="ru-RU" sz="1400" b="0" i="0" u="none" strike="noStrike" dirty="0">
+                <a:solidFill>
+                  <a:srgbClr val="00B0F0"/>
+                </a:solidFill>
+                <a:effectLst/>
+                <a:latin typeface="Menlo" panose="020B0609030804020204" pitchFamily="49" charset="0"/>
+              </a:rPr>
+              <a:t>	</a:t>
+            </a:r>
+            <a:r>
+              <a:rPr lang="en" sz="1400" b="0" i="0" u="none" strike="noStrike" dirty="0" err="1">
+                <a:solidFill>
+                  <a:srgbClr val="00B0F0"/>
+                </a:solidFill>
+                <a:effectLst/>
+                <a:latin typeface="Menlo" panose="020B0609030804020204" pitchFamily="49" charset="0"/>
+              </a:rPr>
+              <a:t>swiftlint</a:t>
+            </a:r>
+            <a:r>
+              <a:rPr lang="en" sz="1400" b="0" i="0" u="none" strike="noStrike" dirty="0">
+                <a:solidFill>
+                  <a:srgbClr val="00B0F0"/>
+                </a:solidFill>
+                <a:effectLst/>
+                <a:latin typeface="Menlo" panose="020B0609030804020204" pitchFamily="49" charset="0"/>
+              </a:rPr>
+              <a:t> lint --use-script-input-files</a:t>
+            </a:r>
+            <a:endParaRPr lang="ru-RU" sz="1400" dirty="0">
+              <a:solidFill>
+                <a:srgbClr val="00B0F0"/>
+              </a:solidFill>
+            </a:endParaRPr>
+          </a:p>
+          <a:p>
+            <a:pPr lvl="1"/>
+            <a:endParaRPr lang="ru-RU" dirty="0"/>
           </a:p>
         </p:txBody>
       </p:sp>
     </p:spTree>
     <p:extLst>
       <p:ext uri="{BB962C8B-B14F-4D97-AF65-F5344CB8AC3E}">
-        <p14:creationId xmlns:p14="http://schemas.microsoft.com/office/powerpoint/2010/main" val="1600230655"/>
+        <p14:creationId xmlns:p14="http://schemas.microsoft.com/office/powerpoint/2010/main" val="2819899561"/>
       </p:ext>
     </p:extLst>
   </p:cSld>
@@ -5329,6 +5227,203 @@
           <p:cNvPr id="2" name="Заголовок 1">
             <a:extLst>
               <a:ext uri="{FF2B5EF4-FFF2-40B4-BE49-F238E27FC236}">
+                <a16:creationId xmlns:a16="http://schemas.microsoft.com/office/drawing/2014/main" id="{31B897F7-0DCF-E745-B78C-D400FE6E3D18}"/>
+              </a:ext>
+            </a:extLst>
+          </p:cNvPr>
+          <p:cNvSpPr>
+            <a:spLocks noGrp="1"/>
+          </p:cNvSpPr>
+          <p:nvPr>
+            <p:ph type="title"/>
+          </p:nvPr>
+        </p:nvSpPr>
+        <p:spPr/>
+        <p:txBody>
+          <a:bodyPr/>
+          <a:lstStyle/>
+          <a:p>
+            <a:r>
+              <a:rPr lang="ru-RU" dirty="0">
+                <a:solidFill>
+                  <a:srgbClr val="7030A0"/>
+                </a:solidFill>
+              </a:rPr>
+              <a:t>Итог</a:t>
+            </a:r>
+          </a:p>
+        </p:txBody>
+      </p:sp>
+      <p:sp>
+        <p:nvSpPr>
+          <p:cNvPr id="3" name="Объект 2">
+            <a:extLst>
+              <a:ext uri="{FF2B5EF4-FFF2-40B4-BE49-F238E27FC236}">
+                <a16:creationId xmlns:a16="http://schemas.microsoft.com/office/drawing/2014/main" id="{65F95F4C-C842-E64F-9E8C-3F671E7857A7}"/>
+              </a:ext>
+            </a:extLst>
+          </p:cNvPr>
+          <p:cNvSpPr>
+            <a:spLocks noGrp="1"/>
+          </p:cNvSpPr>
+          <p:nvPr>
+            <p:ph idx="1"/>
+          </p:nvPr>
+        </p:nvSpPr>
+        <p:spPr/>
+        <p:txBody>
+          <a:bodyPr/>
+          <a:lstStyle/>
+          <a:p>
+            <a:r>
+              <a:rPr lang="en-US" dirty="0" err="1">
+                <a:solidFill>
+                  <a:srgbClr val="FFFF00"/>
+                </a:solidFill>
+              </a:rPr>
+              <a:t>SwiftLint</a:t>
+            </a:r>
+            <a:r>
+              <a:rPr lang="en-US" dirty="0">
+                <a:solidFill>
+                  <a:srgbClr val="FFFF00"/>
+                </a:solidFill>
+              </a:rPr>
+              <a:t> </a:t>
+            </a:r>
+            <a:r>
+              <a:rPr lang="ru-RU" dirty="0">
+                <a:solidFill>
+                  <a:srgbClr val="FFFF00"/>
+                </a:solidFill>
+              </a:rPr>
+              <a:t>нужен</a:t>
+            </a:r>
+            <a:r>
+              <a:rPr lang="ru-RU" dirty="0"/>
+              <a:t> для того, чтобы</a:t>
+            </a:r>
+            <a:r>
+              <a:rPr lang="en-US" dirty="0"/>
+              <a:t>:</a:t>
+            </a:r>
+          </a:p>
+          <a:p>
+            <a:pPr marL="457200" lvl="1" indent="0">
+              <a:buNone/>
+            </a:pPr>
+            <a:r>
+              <a:rPr lang="en-US" dirty="0"/>
+              <a:t>	1) </a:t>
+            </a:r>
+            <a:r>
+              <a:rPr lang="ru-RU" dirty="0">
+                <a:solidFill>
+                  <a:srgbClr val="FFFF00"/>
+                </a:solidFill>
+              </a:rPr>
+              <a:t>Тратить меньше времени на код-</a:t>
+            </a:r>
+            <a:r>
+              <a:rPr lang="ru-RU" dirty="0" err="1">
+                <a:solidFill>
+                  <a:srgbClr val="FFFF00"/>
+                </a:solidFill>
+              </a:rPr>
+              <a:t>ревью</a:t>
+            </a:r>
+            <a:r>
+              <a:rPr lang="ru-RU" dirty="0"/>
+              <a:t> при работе в команде, над объемными проектами</a:t>
+            </a:r>
+          </a:p>
+          <a:p>
+            <a:pPr marL="457200" lvl="1" indent="0">
+              <a:buNone/>
+            </a:pPr>
+            <a:r>
+              <a:rPr lang="ru-RU" dirty="0"/>
+              <a:t>	2) </a:t>
+            </a:r>
+            <a:r>
+              <a:rPr lang="ru-RU" dirty="0">
+                <a:solidFill>
+                  <a:srgbClr val="FFFF00"/>
+                </a:solidFill>
+              </a:rPr>
+              <a:t>Придерживаться единого </a:t>
+            </a:r>
+            <a:r>
+              <a:rPr lang="en" dirty="0">
+                <a:solidFill>
+                  <a:srgbClr val="FFFF00"/>
+                </a:solidFill>
+              </a:rPr>
+              <a:t>Code Style</a:t>
+            </a:r>
+          </a:p>
+          <a:p>
+            <a:pPr marL="457200" lvl="1" indent="0">
+              <a:buNone/>
+            </a:pPr>
+            <a:r>
+              <a:rPr lang="en" dirty="0">
+                <a:solidFill>
+                  <a:srgbClr val="FFFF00"/>
+                </a:solidFill>
+              </a:rPr>
+              <a:t>	</a:t>
+            </a:r>
+            <a:r>
+              <a:rPr lang="en" dirty="0"/>
+              <a:t>3) </a:t>
+            </a:r>
+            <a:r>
+              <a:rPr lang="ru-RU" dirty="0">
+                <a:solidFill>
+                  <a:srgbClr val="FFFF00"/>
+                </a:solidFill>
+              </a:rPr>
+              <a:t>Повысить качество кода</a:t>
+            </a:r>
+          </a:p>
+        </p:txBody>
+      </p:sp>
+    </p:spTree>
+    <p:extLst>
+      <p:ext uri="{BB962C8B-B14F-4D97-AF65-F5344CB8AC3E}">
+        <p14:creationId xmlns:p14="http://schemas.microsoft.com/office/powerpoint/2010/main" val="1600230655"/>
+      </p:ext>
+    </p:extLst>
+  </p:cSld>
+  <p:clrMapOvr>
+    <a:masterClrMapping/>
+  </p:clrMapOvr>
+</p:sld>
+</file>
+
+<file path=ppt/slides/slide16.xml><?xml version="1.0" encoding="utf-8"?>
+<p:sld xmlns:a="http://schemas.openxmlformats.org/drawingml/2006/main" xmlns:r="http://schemas.openxmlformats.org/officeDocument/2006/relationships" xmlns:p="http://schemas.openxmlformats.org/presentationml/2006/main">
+  <p:cSld>
+    <p:spTree>
+      <p:nvGrpSpPr>
+        <p:cNvPr id="1" name=""/>
+        <p:cNvGrpSpPr/>
+        <p:nvPr/>
+      </p:nvGrpSpPr>
+      <p:grpSpPr>
+        <a:xfrm>
+          <a:off x="0" y="0"/>
+          <a:ext cx="0" cy="0"/>
+          <a:chOff x="0" y="0"/>
+          <a:chExt cx="0" cy="0"/>
+        </a:xfrm>
+      </p:grpSpPr>
+      <p:sp>
+        <p:nvSpPr>
+          <p:cNvPr id="2" name="Заголовок 1">
+            <a:extLst>
+              <a:ext uri="{FF2B5EF4-FFF2-40B4-BE49-F238E27FC236}">
                 <a16:creationId xmlns:a16="http://schemas.microsoft.com/office/drawing/2014/main" id="{875CFA3B-F0CB-B648-8DC8-A215511A3078}"/>
               </a:ext>
             </a:extLst>
@@ -5547,99 +5642,9 @@
             </a:endParaRPr>
           </a:p>
           <a:p>
-            <a:r>
-              <a:rPr lang="ru-RU" dirty="0">
-                <a:solidFill>
-                  <a:srgbClr val="FFFF00"/>
-                </a:solidFill>
-              </a:rPr>
-              <a:t>Полезная статья на </a:t>
-            </a:r>
-            <a:r>
-              <a:rPr lang="ru-RU" dirty="0" err="1">
-                <a:solidFill>
-                  <a:srgbClr val="FFFF00"/>
-                </a:solidFill>
-              </a:rPr>
-              <a:t>хабре</a:t>
-            </a:r>
-            <a:r>
-              <a:rPr lang="en-US" dirty="0">
-                <a:solidFill>
-                  <a:srgbClr val="FFFF00"/>
-                </a:solidFill>
-              </a:rPr>
-              <a:t>:</a:t>
-            </a:r>
-            <a:endParaRPr lang="ru-RU" sz="2000" dirty="0">
-              <a:solidFill>
-                <a:srgbClr val="00B0F0"/>
-              </a:solidFill>
-            </a:endParaRPr>
-          </a:p>
-          <a:p>
-            <a:r>
-              <a:rPr lang="ru-RU" dirty="0">
-                <a:solidFill>
-                  <a:srgbClr val="FFFF00"/>
-                </a:solidFill>
-              </a:rPr>
-              <a:t>Полезная статья на </a:t>
-            </a:r>
-            <a:r>
-              <a:rPr lang="ru-RU" dirty="0" err="1">
-                <a:solidFill>
-                  <a:srgbClr val="FFFF00"/>
-                </a:solidFill>
-              </a:rPr>
-              <a:t>хабре</a:t>
-            </a:r>
-            <a:r>
-              <a:rPr lang="en-US" dirty="0">
-                <a:solidFill>
-                  <a:srgbClr val="FFFF00"/>
-                </a:solidFill>
-              </a:rPr>
-              <a:t>:</a:t>
-            </a:r>
-            <a:endParaRPr lang="ru-RU" sz="2000" dirty="0">
-              <a:solidFill>
-                <a:srgbClr val="00B0F0"/>
-              </a:solidFill>
-            </a:endParaRPr>
-          </a:p>
-          <a:p>
-            <a:r>
-              <a:rPr lang="ru-RU" dirty="0">
-                <a:solidFill>
-                  <a:srgbClr val="FFFF00"/>
-                </a:solidFill>
-              </a:rPr>
-              <a:t>Полезная статья на </a:t>
-            </a:r>
-            <a:r>
-              <a:rPr lang="ru-RU" dirty="0" err="1">
-                <a:solidFill>
-                  <a:srgbClr val="FFFF00"/>
-                </a:solidFill>
-              </a:rPr>
-              <a:t>хабре</a:t>
-            </a:r>
-            <a:r>
-              <a:rPr lang="en-US" dirty="0">
-                <a:solidFill>
-                  <a:srgbClr val="FFFF00"/>
-                </a:solidFill>
-              </a:rPr>
-              <a:t>:</a:t>
-            </a:r>
-            <a:endParaRPr lang="ru-RU" sz="2000" dirty="0">
-              <a:solidFill>
-                <a:srgbClr val="00B0F0"/>
-              </a:solidFill>
-            </a:endParaRPr>
-          </a:p>
-          <a:p>
+            <a:pPr marL="0" indent="0">
+              <a:buNone/>
+            </a:pPr>
             <a:endParaRPr lang="ru-RU" dirty="0">
               <a:solidFill>
                 <a:srgbClr val="FFFF00"/>
@@ -5681,7 +5686,7 @@
 </p:sld>
 </file>
 
-<file path=ppt/slides/slide16.xml><?xml version="1.0" encoding="utf-8"?>
+<file path=ppt/slides/slide17.xml><?xml version="1.0" encoding="utf-8"?>
 <p:sld xmlns:a="http://schemas.openxmlformats.org/drawingml/2006/main" xmlns:r="http://schemas.openxmlformats.org/officeDocument/2006/relationships" xmlns:p="http://schemas.openxmlformats.org/presentationml/2006/main">
   <p:cSld>
     <p:spTree>
@@ -7448,7 +7453,7 @@
         </p:spPr>
         <p:txBody>
           <a:bodyPr>
-            <a:normAutofit/>
+            <a:normAutofit lnSpcReduction="10000"/>
           </a:bodyPr>
           <a:lstStyle/>
           <a:p>
@@ -7624,7 +7629,15 @@
                   <a:srgbClr val="FFFF00"/>
                 </a:solidFill>
               </a:rPr>
-              <a:t>kind – </a:t>
+              <a:t>kind </a:t>
+            </a:r>
+            <a:r>
+              <a:rPr lang="en-US" dirty="0"/>
+              <a:t>– </a:t>
+            </a:r>
+            <a:r>
+              <a:rPr lang="ru-RU" dirty="0"/>
+              <a:t>категория правила</a:t>
             </a:r>
             <a:r>
               <a:rPr lang="ru-RU" dirty="0">
@@ -7632,7 +7645,23 @@
                   <a:srgbClr val="FFFF00"/>
                 </a:solidFill>
               </a:rPr>
-              <a:t>категория правила (</a:t>
+              <a:t> (</a:t>
+            </a:r>
+            <a:r>
+              <a:rPr lang="ru-RU" dirty="0" err="1">
+                <a:solidFill>
+                  <a:srgbClr val="FFFF00"/>
+                </a:solidFill>
+              </a:rPr>
+              <a:t>l</a:t>
+            </a:r>
+            <a:r>
+              <a:rPr lang="en-US" dirty="0">
+                <a:solidFill>
+                  <a:srgbClr val="FFFF00"/>
+                </a:solidFill>
+              </a:rPr>
+              <a:t>int, idiomatic, style, metrics, performance)</a:t>
             </a:r>
             <a:endParaRPr lang="en-US" dirty="0"/>
           </a:p>
@@ -7653,13 +7682,31 @@
                 </a:solidFill>
                 <a:effectLst/>
               </a:rPr>
-              <a:t>nalyzer - </a:t>
+              <a:t>nalyzer </a:t>
+            </a:r>
+            <a:r>
+              <a:rPr lang="en-US" b="0" i="0" u="none" strike="noStrike" dirty="0">
+                <a:effectLst/>
+              </a:rPr>
+              <a:t>- </a:t>
             </a:r>
             <a:r>
               <a:rPr lang="ru-RU" b="0" i="0" u="none" strike="noStrike" dirty="0">
                 <a:effectLst/>
               </a:rPr>
-              <a:t>????</a:t>
+              <a:t>правило, которое может работать с </a:t>
+            </a:r>
+            <a:r>
+              <a:rPr lang="en" b="0" i="0" u="none" strike="noStrike" dirty="0">
+                <a:effectLst/>
+              </a:rPr>
+              <a:t>AST, </a:t>
+            </a:r>
+            <a:r>
+              <a:rPr lang="ru-RU" b="0" i="0" u="none" strike="noStrike" dirty="0">
+                <a:effectLst/>
+              </a:rPr>
+              <a:t>проверенным после проверки типа, используя аргументы компилятора. </a:t>
             </a:r>
           </a:p>
           <a:p>
@@ -7766,7 +7813,7 @@
                   <a:srgbClr val="7030A0"/>
                 </a:solidFill>
               </a:rPr>
-              <a:t>Правила</a:t>
+              <a:t>Правила !!!!!!</a:t>
             </a:r>
           </a:p>
         </p:txBody>
@@ -8309,7 +8356,7 @@
                   <a:srgbClr val="7030A0"/>
                 </a:solidFill>
               </a:rPr>
-              <a:t>Конфигурация (настройка правил)</a:t>
+              <a:t>Конфигурация (настройка правил) !!!!!!</a:t>
             </a:r>
           </a:p>
         </p:txBody>
@@ -8330,25 +8377,30 @@
             <p:ph idx="1"/>
           </p:nvPr>
         </p:nvSpPr>
-        <p:spPr/>
+        <p:spPr>
+          <a:xfrm>
+            <a:off x="838200" y="1825624"/>
+            <a:ext cx="10515600" cy="4921539"/>
+          </a:xfrm>
+        </p:spPr>
         <p:txBody>
           <a:bodyPr>
-            <a:normAutofit/>
+            <a:normAutofit fontScale="85000" lnSpcReduction="20000"/>
           </a:bodyPr>
           <a:lstStyle/>
           <a:p>
             <a:r>
-              <a:rPr lang="ru-RU" b="0" i="0" u="none" strike="noStrike" dirty="0">
+              <a:rPr lang="ru-RU" sz="2600" b="0" i="0" u="none" strike="noStrike" dirty="0">
                 <a:effectLst/>
               </a:rPr>
               <a:t>Для того </a:t>
             </a:r>
             <a:r>
-              <a:rPr lang="ru-RU" dirty="0"/>
+              <a:rPr lang="ru-RU" sz="2600" dirty="0"/>
               <a:t>чтобы </a:t>
             </a:r>
             <a:r>
-              <a:rPr lang="ru-RU" b="0" i="0" u="none" strike="noStrike" dirty="0">
+              <a:rPr lang="ru-RU" sz="2600" b="0" i="0" u="none" strike="noStrike" dirty="0">
                 <a:solidFill>
                   <a:srgbClr val="FFFF00"/>
                 </a:solidFill>
@@ -8357,13 +8409,13 @@
               <a:t>отключить, настроить</a:t>
             </a:r>
             <a:r>
-              <a:rPr lang="ru-RU" b="0" i="0" u="none" strike="noStrike" dirty="0">
+              <a:rPr lang="ru-RU" sz="2600" b="0" i="0" u="none" strike="noStrike" dirty="0">
                 <a:effectLst/>
               </a:rPr>
               <a:t> или </a:t>
             </a:r>
             <a:r>
-              <a:rPr lang="ru-RU" b="0" i="0" u="none" strike="noStrike" dirty="0">
+              <a:rPr lang="ru-RU" sz="2600" b="0" i="0" u="none" strike="noStrike" dirty="0">
                 <a:solidFill>
                   <a:srgbClr val="FFFF00"/>
                 </a:solidFill>
@@ -8372,13 +8424,13 @@
               <a:t>добавить</a:t>
             </a:r>
             <a:r>
-              <a:rPr lang="ru-RU" b="0" i="0" u="none" strike="noStrike" dirty="0">
+              <a:rPr lang="ru-RU" sz="2600" b="0" i="0" u="none" strike="noStrike" dirty="0">
                 <a:effectLst/>
               </a:rPr>
               <a:t> какие-либо правила необходимо </a:t>
             </a:r>
             <a:r>
-              <a:rPr lang="ru-RU" b="0" i="0" u="none" strike="noStrike" dirty="0">
+              <a:rPr lang="ru-RU" sz="2600" b="0" i="0" u="none" strike="noStrike" dirty="0">
                 <a:solidFill>
                   <a:srgbClr val="FFFF00"/>
                 </a:solidFill>
@@ -8387,7 +8439,7 @@
               <a:t>в корне проекта создать файл .</a:t>
             </a:r>
             <a:r>
-              <a:rPr lang="en" b="0" i="0" u="none" strike="noStrike" dirty="0" err="1">
+              <a:rPr lang="en" sz="2600" b="0" i="0" u="none" strike="noStrike" dirty="0" err="1">
                 <a:solidFill>
                   <a:srgbClr val="FFFF00"/>
                 </a:solidFill>
@@ -8396,7 +8448,7 @@
               <a:t>swiftlint.yml</a:t>
             </a:r>
             <a:r>
-              <a:rPr lang="en" dirty="0">
+              <a:rPr lang="en" sz="2600" dirty="0">
                 <a:solidFill>
                   <a:srgbClr val="FFFF00"/>
                 </a:solidFill>
@@ -8407,7 +8459,7 @@
           <a:p>
             <a:pPr lvl="1"/>
             <a:r>
-              <a:rPr lang="en" sz="2000" dirty="0">
+              <a:rPr lang="en" sz="1900" dirty="0">
                 <a:solidFill>
                   <a:srgbClr val="00B0F0"/>
                 </a:solidFill>
@@ -8415,31 +8467,326 @@
               <a:t>touch </a:t>
             </a:r>
             <a:r>
-              <a:rPr lang="en" sz="2000" b="0" i="0" u="none" strike="noStrike" dirty="0">
-                <a:solidFill>
-                  <a:srgbClr val="00B0F0"/>
-                </a:solidFill>
-                <a:effectLst/>
-                <a:latin typeface="-apple-system"/>
+              <a:rPr lang="en" sz="1900" b="0" i="0" u="none" strike="noStrike" dirty="0">
+                <a:solidFill>
+                  <a:srgbClr val="00B0F0"/>
+                </a:solidFill>
+                <a:effectLst/>
               </a:rPr>
               <a:t>.</a:t>
             </a:r>
             <a:r>
-              <a:rPr lang="en" sz="2000" b="0" i="0" u="none" strike="noStrike" dirty="0" err="1">
-                <a:solidFill>
-                  <a:srgbClr val="00B0F0"/>
-                </a:solidFill>
-                <a:effectLst/>
-                <a:latin typeface="-apple-system"/>
+              <a:rPr lang="en" sz="1900" b="0" i="0" u="none" strike="noStrike" dirty="0" err="1">
+                <a:solidFill>
+                  <a:srgbClr val="00B0F0"/>
+                </a:solidFill>
+                <a:effectLst/>
               </a:rPr>
               <a:t>swiftlint.yml</a:t>
             </a:r>
-            <a:endParaRPr lang="en" sz="2000" b="0" i="0" u="none" strike="noStrike" dirty="0">
+            <a:endParaRPr lang="en" sz="1900" b="0" i="0" u="none" strike="noStrike" dirty="0">
               <a:solidFill>
                 <a:srgbClr val="00B0F0"/>
               </a:solidFill>
               <a:effectLst/>
-              <a:latin typeface="-apple-system"/>
+            </a:endParaRPr>
+          </a:p>
+          <a:p>
+            <a:pPr marL="0" indent="0">
+              <a:buNone/>
+            </a:pPr>
+            <a:endParaRPr lang="en" dirty="0">
+              <a:solidFill>
+                <a:srgbClr val="FFFF00"/>
+              </a:solidFill>
+            </a:endParaRPr>
+          </a:p>
+          <a:p>
+            <a:r>
+              <a:rPr lang="ru-RU" sz="2600" b="0" i="0" u="none" strike="noStrike" dirty="0">
+                <a:effectLst/>
+              </a:rPr>
+              <a:t>Список правил, которые необходимо отключить</a:t>
+            </a:r>
+            <a:r>
+              <a:rPr lang="en-US" sz="2600" b="0" i="0" u="none" strike="noStrike" dirty="0">
+                <a:effectLst/>
+              </a:rPr>
+              <a:t> -</a:t>
+            </a:r>
+            <a:r>
+              <a:rPr lang="en-US" sz="2600" b="0" i="0" u="none" strike="noStrike" dirty="0">
+                <a:solidFill>
+                  <a:srgbClr val="FFFF00"/>
+                </a:solidFill>
+                <a:effectLst/>
+              </a:rPr>
+              <a:t> </a:t>
+            </a:r>
+            <a:r>
+              <a:rPr lang="en" sz="2600" dirty="0" err="1">
+                <a:solidFill>
+                  <a:srgbClr val="FFFF00"/>
+                </a:solidFill>
+              </a:rPr>
+              <a:t>disabled_rules</a:t>
+            </a:r>
+            <a:endParaRPr lang="en-US" sz="2600" b="0" i="0" u="none" strike="noStrike" dirty="0">
+              <a:solidFill>
+                <a:srgbClr val="FFFF00"/>
+              </a:solidFill>
+              <a:effectLst/>
+            </a:endParaRPr>
+          </a:p>
+          <a:p>
+            <a:r>
+              <a:rPr lang="ru-RU" sz="2600" b="0" i="0" u="none" strike="noStrike" dirty="0">
+                <a:effectLst/>
+              </a:rPr>
+              <a:t>Список опциональных правил, которые необходимо включить (по умолчанию отключены)</a:t>
+            </a:r>
+            <a:r>
+              <a:rPr lang="en-US" sz="2600" b="0" i="0" u="none" strike="noStrike" dirty="0">
+                <a:effectLst/>
+              </a:rPr>
+              <a:t> - </a:t>
+            </a:r>
+            <a:r>
+              <a:rPr lang="en" sz="2600" dirty="0" err="1">
+                <a:solidFill>
+                  <a:srgbClr val="FFFF00"/>
+                </a:solidFill>
+              </a:rPr>
+              <a:t>opt_in_rules</a:t>
+            </a:r>
+            <a:endParaRPr lang="ru-RU" sz="2600" dirty="0">
+              <a:solidFill>
+                <a:srgbClr val="FFFF00"/>
+              </a:solidFill>
+            </a:endParaRPr>
+          </a:p>
+          <a:p>
+            <a:r>
+              <a:rPr lang="ru-RU" sz="2600" b="0" i="0" u="none" strike="noStrike" dirty="0">
+                <a:effectLst/>
+              </a:rPr>
+              <a:t>Исключить подкаталоги или файлы – </a:t>
+            </a:r>
+            <a:r>
+              <a:rPr lang="en" sz="2600" dirty="0">
+                <a:solidFill>
+                  <a:srgbClr val="FFFF00"/>
+                </a:solidFill>
+              </a:rPr>
+              <a:t>excluded</a:t>
+            </a:r>
+            <a:endParaRPr lang="ru-RU" sz="2600" dirty="0">
+              <a:solidFill>
+                <a:srgbClr val="FFFF00"/>
+              </a:solidFill>
+            </a:endParaRPr>
+          </a:p>
+          <a:p>
+            <a:r>
+              <a:rPr lang="ru-RU" sz="2600" b="0" i="0" u="none" strike="noStrike" dirty="0">
+                <a:effectLst/>
+              </a:rPr>
+              <a:t>Включить подкаталоги или файлы –</a:t>
+            </a:r>
+            <a:r>
+              <a:rPr lang="ru-RU" sz="2600" b="0" i="0" u="none" strike="noStrike" dirty="0">
+                <a:solidFill>
+                  <a:srgbClr val="FFFF00"/>
+                </a:solidFill>
+                <a:effectLst/>
+              </a:rPr>
+              <a:t> </a:t>
+            </a:r>
+            <a:r>
+              <a:rPr lang="en" sz="2600" dirty="0">
+                <a:solidFill>
+                  <a:srgbClr val="FFFF00"/>
+                </a:solidFill>
+              </a:rPr>
+              <a:t>included</a:t>
+            </a:r>
+            <a:endParaRPr lang="ru-RU" sz="2600" dirty="0">
+              <a:solidFill>
+                <a:srgbClr val="FFFF00"/>
+              </a:solidFill>
+            </a:endParaRPr>
+          </a:p>
+          <a:p>
+            <a:r>
+              <a:rPr lang="ru-RU" sz="2600" b="0" i="0" u="none" strike="noStrike" dirty="0">
+                <a:effectLst/>
+              </a:rPr>
+              <a:t>Параметры правил (доступные параметры можно найти в списке правил) - </a:t>
+            </a:r>
+            <a:r>
+              <a:rPr lang="en" sz="2600" dirty="0" err="1">
+                <a:solidFill>
+                  <a:srgbClr val="FFFF00"/>
+                </a:solidFill>
+              </a:rPr>
+              <a:t>file_length</a:t>
+            </a:r>
+            <a:endParaRPr lang="ru-RU" sz="2600" dirty="0">
+              <a:solidFill>
+                <a:srgbClr val="FFFF00"/>
+              </a:solidFill>
+            </a:endParaRPr>
+          </a:p>
+          <a:p>
+            <a:r>
+              <a:rPr lang="ru-RU" sz="2600" b="0" i="0" u="none" strike="noStrike" dirty="0">
+                <a:effectLst/>
+              </a:rPr>
+              <a:t>Тип отчета (параметры: </a:t>
+            </a:r>
+            <a:r>
+              <a:rPr lang="en" sz="2600" b="0" i="0" u="none" strike="noStrike" dirty="0" err="1">
+                <a:effectLst/>
+              </a:rPr>
+              <a:t>xcode</a:t>
+            </a:r>
+            <a:r>
+              <a:rPr lang="en" sz="2600" b="0" i="0" u="none" strike="noStrike" dirty="0">
+                <a:effectLst/>
+              </a:rPr>
+              <a:t>, json, csv, </a:t>
+            </a:r>
+            <a:r>
+              <a:rPr lang="en" sz="2600" b="0" i="0" u="none" strike="noStrike" dirty="0" err="1">
+                <a:effectLst/>
+              </a:rPr>
+              <a:t>checkstyle</a:t>
+            </a:r>
+            <a:r>
+              <a:rPr lang="en" sz="2600" b="0" i="0" u="none" strike="noStrike" dirty="0">
+                <a:effectLst/>
+              </a:rPr>
+              <a:t>, </a:t>
+            </a:r>
+            <a:r>
+              <a:rPr lang="en" sz="2600" b="0" i="0" u="none" strike="noStrike" dirty="0" err="1">
+                <a:effectLst/>
+              </a:rPr>
+              <a:t>junit</a:t>
+            </a:r>
+            <a:r>
+              <a:rPr lang="ru-RU" sz="2600" b="0" i="0" u="none" strike="noStrike" dirty="0">
+                <a:effectLst/>
+              </a:rPr>
+              <a:t>) –</a:t>
+            </a:r>
+            <a:r>
+              <a:rPr lang="en-US" sz="2600" b="0" i="0" u="none" strike="noStrike" dirty="0">
+                <a:effectLst/>
+              </a:rPr>
+              <a:t> </a:t>
+            </a:r>
+            <a:r>
+              <a:rPr lang="en" sz="2600" dirty="0">
+                <a:solidFill>
+                  <a:srgbClr val="FFFF00"/>
+                </a:solidFill>
+              </a:rPr>
+              <a:t>reporter</a:t>
+            </a:r>
+          </a:p>
+          <a:p>
+            <a:r>
+              <a:rPr lang="ru-RU" sz="2600" b="0" i="0" u="none" strike="noStrike" dirty="0">
+                <a:effectLst/>
+              </a:rPr>
+              <a:t>Максимально допустимое количество предупреждений</a:t>
+            </a:r>
+            <a:r>
+              <a:rPr lang="en-US" sz="2600" b="0" i="0" u="none" strike="noStrike" dirty="0">
+                <a:effectLst/>
+              </a:rPr>
+              <a:t> - </a:t>
+            </a:r>
+            <a:r>
+              <a:rPr lang="en" sz="2600" dirty="0" err="1">
+                <a:solidFill>
+                  <a:srgbClr val="FFFF00"/>
+                </a:solidFill>
+              </a:rPr>
+              <a:t>warning_threshold</a:t>
+            </a:r>
+            <a:endParaRPr lang="en" dirty="0">
+              <a:solidFill>
+                <a:srgbClr val="FFFF00"/>
+              </a:solidFill>
+            </a:endParaRPr>
+          </a:p>
+          <a:p>
+            <a:pPr marL="0" indent="0">
+              <a:buNone/>
+            </a:pPr>
+            <a:endParaRPr lang="en" dirty="0">
+              <a:solidFill>
+                <a:srgbClr val="FFFF00"/>
+              </a:solidFill>
+            </a:endParaRPr>
+          </a:p>
+          <a:p>
+            <a:r>
+              <a:rPr lang="ru-RU" sz="1800" b="0" i="0" u="none" strike="noStrike" dirty="0">
+                <a:solidFill>
+                  <a:schemeClr val="tx1">
+                    <a:lumMod val="50000"/>
+                  </a:schemeClr>
+                </a:solidFill>
+                <a:effectLst/>
+                <a:latin typeface="-apple-system"/>
+              </a:rPr>
+              <a:t>Совет: добавьте в файл конфигурации </a:t>
+            </a:r>
+            <a:r>
+              <a:rPr lang="en" sz="1800" b="0" i="0" u="none" strike="noStrike" dirty="0" err="1">
+                <a:solidFill>
+                  <a:schemeClr val="tx1">
+                    <a:lumMod val="50000"/>
+                  </a:schemeClr>
+                </a:solidFill>
+                <a:effectLst/>
+                <a:latin typeface="-apple-system"/>
+              </a:rPr>
+              <a:t>warning_threshold</a:t>
+            </a:r>
+            <a:r>
+              <a:rPr lang="en" sz="1800" b="0" i="0" u="none" strike="noStrike" dirty="0">
+                <a:solidFill>
+                  <a:schemeClr val="tx1">
+                    <a:lumMod val="50000"/>
+                  </a:schemeClr>
+                </a:solidFill>
+                <a:effectLst/>
+                <a:latin typeface="-apple-system"/>
+              </a:rPr>
+              <a:t>, </a:t>
+            </a:r>
+            <a:r>
+              <a:rPr lang="ru-RU" sz="1800" b="0" i="0" u="none" strike="noStrike" dirty="0">
+                <a:solidFill>
+                  <a:schemeClr val="tx1">
+                    <a:lumMod val="50000"/>
+                  </a:schemeClr>
+                </a:solidFill>
+                <a:effectLst/>
+                <a:latin typeface="-apple-system"/>
+              </a:rPr>
+              <a:t>чтобы количество предупреждений не увеличивалось.</a:t>
+            </a:r>
+            <a:endParaRPr lang="en" sz="1800" dirty="0">
+              <a:solidFill>
+                <a:schemeClr val="tx1">
+                  <a:lumMod val="50000"/>
+                </a:schemeClr>
+              </a:solidFill>
             </a:endParaRPr>
           </a:p>
         </p:txBody>

</xml_diff>

<commit_message>
Finished presentation about SwiftLint
</commit_message>
<xml_diff>
--- a/Presentation/SwiftLint-30.09.2022/SwiftLint-Abrosov.pptx
+++ b/Presentation/SwiftLint-30.09.2022/SwiftLint-Abrosov.pptx
@@ -259,7 +259,7 @@
           <a:p>
             <a:fld id="{647CFE86-70FD-5945-A876-E5B01236E453}" type="datetimeFigureOut">
               <a:rPr lang="ru-RU" smtClean="0"/>
-              <a:t>20.09.2022</a:t>
+              <a:t>22.09.2022</a:t>
             </a:fld>
             <a:endParaRPr lang="ru-RU"/>
           </a:p>
@@ -429,7 +429,7 @@
           <a:p>
             <a:fld id="{647CFE86-70FD-5945-A876-E5B01236E453}" type="datetimeFigureOut">
               <a:rPr lang="ru-RU" smtClean="0"/>
-              <a:t>20.09.2022</a:t>
+              <a:t>22.09.2022</a:t>
             </a:fld>
             <a:endParaRPr lang="ru-RU"/>
           </a:p>
@@ -609,7 +609,7 @@
           <a:p>
             <a:fld id="{647CFE86-70FD-5945-A876-E5B01236E453}" type="datetimeFigureOut">
               <a:rPr lang="ru-RU" smtClean="0"/>
-              <a:t>20.09.2022</a:t>
+              <a:t>22.09.2022</a:t>
             </a:fld>
             <a:endParaRPr lang="ru-RU"/>
           </a:p>
@@ -779,7 +779,7 @@
           <a:p>
             <a:fld id="{647CFE86-70FD-5945-A876-E5B01236E453}" type="datetimeFigureOut">
               <a:rPr lang="ru-RU" smtClean="0"/>
-              <a:t>20.09.2022</a:t>
+              <a:t>22.09.2022</a:t>
             </a:fld>
             <a:endParaRPr lang="ru-RU"/>
           </a:p>
@@ -1025,7 +1025,7 @@
           <a:p>
             <a:fld id="{647CFE86-70FD-5945-A876-E5B01236E453}" type="datetimeFigureOut">
               <a:rPr lang="ru-RU" smtClean="0"/>
-              <a:t>20.09.2022</a:t>
+              <a:t>22.09.2022</a:t>
             </a:fld>
             <a:endParaRPr lang="ru-RU"/>
           </a:p>
@@ -1257,7 +1257,7 @@
           <a:p>
             <a:fld id="{647CFE86-70FD-5945-A876-E5B01236E453}" type="datetimeFigureOut">
               <a:rPr lang="ru-RU" smtClean="0"/>
-              <a:t>20.09.2022</a:t>
+              <a:t>22.09.2022</a:t>
             </a:fld>
             <a:endParaRPr lang="ru-RU"/>
           </a:p>
@@ -1624,7 +1624,7 @@
           <a:p>
             <a:fld id="{647CFE86-70FD-5945-A876-E5B01236E453}" type="datetimeFigureOut">
               <a:rPr lang="ru-RU" smtClean="0"/>
-              <a:t>20.09.2022</a:t>
+              <a:t>22.09.2022</a:t>
             </a:fld>
             <a:endParaRPr lang="ru-RU"/>
           </a:p>
@@ -1742,7 +1742,7 @@
           <a:p>
             <a:fld id="{647CFE86-70FD-5945-A876-E5B01236E453}" type="datetimeFigureOut">
               <a:rPr lang="ru-RU" smtClean="0"/>
-              <a:t>20.09.2022</a:t>
+              <a:t>22.09.2022</a:t>
             </a:fld>
             <a:endParaRPr lang="ru-RU"/>
           </a:p>
@@ -1837,7 +1837,7 @@
           <a:p>
             <a:fld id="{647CFE86-70FD-5945-A876-E5B01236E453}" type="datetimeFigureOut">
               <a:rPr lang="ru-RU" smtClean="0"/>
-              <a:t>20.09.2022</a:t>
+              <a:t>22.09.2022</a:t>
             </a:fld>
             <a:endParaRPr lang="ru-RU"/>
           </a:p>
@@ -2114,7 +2114,7 @@
           <a:p>
             <a:fld id="{647CFE86-70FD-5945-A876-E5B01236E453}" type="datetimeFigureOut">
               <a:rPr lang="ru-RU" smtClean="0"/>
-              <a:t>20.09.2022</a:t>
+              <a:t>22.09.2022</a:t>
             </a:fld>
             <a:endParaRPr lang="ru-RU"/>
           </a:p>
@@ -2371,7 +2371,7 @@
           <a:p>
             <a:fld id="{647CFE86-70FD-5945-A876-E5B01236E453}" type="datetimeFigureOut">
               <a:rPr lang="ru-RU" smtClean="0"/>
-              <a:t>20.09.2022</a:t>
+              <a:t>22.09.2022</a:t>
             </a:fld>
             <a:endParaRPr lang="ru-RU"/>
           </a:p>
@@ -2584,7 +2584,7 @@
           <a:p>
             <a:fld id="{647CFE86-70FD-5945-A876-E5B01236E453}" type="datetimeFigureOut">
               <a:rPr lang="ru-RU" smtClean="0"/>
-              <a:t>20.09.2022</a:t>
+              <a:t>22.09.2022</a:t>
             </a:fld>
             <a:endParaRPr lang="ru-RU"/>
           </a:p>
@@ -7813,7 +7813,7 @@
                   <a:srgbClr val="7030A0"/>
                 </a:solidFill>
               </a:rPr>
-              <a:t>Правила !!!!!!</a:t>
+              <a:t>Правила</a:t>
             </a:r>
           </a:p>
         </p:txBody>
@@ -7834,10 +7834,15 @@
             <p:ph idx="1"/>
           </p:nvPr>
         </p:nvSpPr>
-        <p:spPr/>
+        <p:spPr>
+          <a:xfrm>
+            <a:off x="838200" y="1825625"/>
+            <a:ext cx="10515600" cy="4667250"/>
+          </a:xfrm>
+        </p:spPr>
         <p:txBody>
           <a:bodyPr>
-            <a:normAutofit fontScale="92500"/>
+            <a:normAutofit lnSpcReduction="10000"/>
           </a:bodyPr>
           <a:lstStyle/>
           <a:p>
@@ -7874,7 +7879,7 @@
           <a:p>
             <a:pPr lvl="1"/>
             <a:r>
-              <a:rPr lang="en" sz="2000" dirty="0">
+              <a:rPr lang="en" sz="1600" dirty="0">
                 <a:solidFill>
                   <a:srgbClr val="00B0F0"/>
                 </a:solidFill>
@@ -7882,7 +7887,7 @@
               <a:t>https://</a:t>
             </a:r>
             <a:r>
-              <a:rPr lang="en" sz="2000" dirty="0" err="1">
+              <a:rPr lang="en" sz="1600" dirty="0" err="1">
                 <a:solidFill>
                   <a:srgbClr val="00B0F0"/>
                 </a:solidFill>
@@ -7890,7 +7895,7 @@
               <a:t>github.com</a:t>
             </a:r>
             <a:r>
-              <a:rPr lang="en" sz="2000" dirty="0">
+              <a:rPr lang="en" sz="1600" dirty="0">
                 <a:solidFill>
                   <a:srgbClr val="00B0F0"/>
                 </a:solidFill>
@@ -7898,7 +7903,7 @@
               <a:t>/realm/</a:t>
             </a:r>
             <a:r>
-              <a:rPr lang="en" sz="2000" dirty="0" err="1">
+              <a:rPr lang="en" sz="1600" dirty="0" err="1">
                 <a:solidFill>
                   <a:srgbClr val="00B0F0"/>
                 </a:solidFill>
@@ -7906,7 +7911,7 @@
               <a:t>SwiftLint</a:t>
             </a:r>
             <a:r>
-              <a:rPr lang="en" sz="2000" dirty="0">
+              <a:rPr lang="en" sz="1600" dirty="0">
                 <a:solidFill>
                   <a:srgbClr val="00B0F0"/>
                 </a:solidFill>
@@ -7914,7 +7919,7 @@
               <a:t>/tree/main/Source/</a:t>
             </a:r>
             <a:r>
-              <a:rPr lang="en" sz="2000" dirty="0" err="1">
+              <a:rPr lang="en" sz="1600" dirty="0" err="1">
                 <a:solidFill>
                   <a:srgbClr val="00B0F0"/>
                 </a:solidFill>
@@ -7922,14 +7927,14 @@
               <a:t>SwiftLintFramework</a:t>
             </a:r>
             <a:r>
-              <a:rPr lang="en" sz="2000" dirty="0">
+              <a:rPr lang="en" sz="1600" dirty="0">
                 <a:solidFill>
                   <a:srgbClr val="00B0F0"/>
                 </a:solidFill>
               </a:rPr>
               <a:t>/Rules</a:t>
             </a:r>
-            <a:endParaRPr lang="ru-RU" sz="2000" dirty="0">
+            <a:endParaRPr lang="ru-RU" sz="1600" dirty="0">
               <a:solidFill>
                 <a:srgbClr val="00B0F0"/>
               </a:solidFill>
@@ -8061,9 +8066,57 @@
               <a:rPr lang="en-US" sz="2200" dirty="0">
                 <a:latin typeface="-apple-system"/>
               </a:rPr>
-              <a:t>;</a:t>
-            </a:r>
-            <a:endParaRPr lang="ru-RU" sz="2200" b="0" i="0" strike="noStrike" dirty="0">
+              <a:t> </a:t>
+            </a:r>
+            <a:r>
+              <a:rPr lang="en-US" sz="1700" dirty="0">
+                <a:solidFill>
+                  <a:srgbClr val="00B0F0"/>
+                </a:solidFill>
+                <a:latin typeface="-apple-system"/>
+              </a:rPr>
+              <a:t>(https://</a:t>
+            </a:r>
+            <a:r>
+              <a:rPr lang="en-US" sz="1700" dirty="0" err="1">
+                <a:solidFill>
+                  <a:srgbClr val="00B0F0"/>
+                </a:solidFill>
+                <a:latin typeface="-apple-system"/>
+              </a:rPr>
+              <a:t>ru.wikipedia.org</a:t>
+            </a:r>
+            <a:r>
+              <a:rPr lang="en-US" sz="1700" dirty="0">
+                <a:solidFill>
+                  <a:srgbClr val="00B0F0"/>
+                </a:solidFill>
+                <a:latin typeface="-apple-system"/>
+              </a:rPr>
+              <a:t>/wiki/</a:t>
+            </a:r>
+            <a:r>
+              <a:rPr lang="ru-RU" sz="1700" dirty="0" err="1">
+                <a:solidFill>
+                  <a:srgbClr val="00B0F0"/>
+                </a:solidFill>
+                <a:latin typeface="-apple-system"/>
+              </a:rPr>
+              <a:t>Цикломатическая_сложность</a:t>
+            </a:r>
+            <a:r>
+              <a:rPr lang="en-US" sz="1700" dirty="0">
+                <a:solidFill>
+                  <a:srgbClr val="00B0F0"/>
+                </a:solidFill>
+                <a:latin typeface="-apple-system"/>
+              </a:rPr>
+              <a:t>);</a:t>
+            </a:r>
+            <a:endParaRPr lang="ru-RU" sz="1700" b="0" i="0" strike="noStrike" dirty="0">
+              <a:solidFill>
+                <a:srgbClr val="00B0F0"/>
+              </a:solidFill>
               <a:effectLst/>
               <a:latin typeface="-apple-system"/>
             </a:endParaRPr>
@@ -8219,6 +8272,17 @@
               </a:rPr>
               <a:t>;</a:t>
             </a:r>
+            <a:r>
+              <a:rPr lang="en-US" sz="2200" b="0" i="0" u="none" strike="noStrike" dirty="0">
+                <a:effectLst/>
+                <a:latin typeface="-apple-system"/>
+              </a:rPr>
+              <a:t> </a:t>
+            </a:r>
+            <a:endParaRPr lang="ru-RU" sz="2200" b="0" i="0" u="none" strike="noStrike" dirty="0">
+              <a:effectLst/>
+              <a:latin typeface="-apple-system"/>
+            </a:endParaRPr>
           </a:p>
           <a:p>
             <a:pPr lvl="1"/>
@@ -8356,7 +8420,7 @@
                   <a:srgbClr val="7030A0"/>
                 </a:solidFill>
               </a:rPr>
-              <a:t>Конфигурация (настройка правил) !!!!!!</a:t>
+              <a:t>Конфигурация (настройка правил)</a:t>
             </a:r>
           </a:p>
         </p:txBody>

</xml_diff>